<commit_message>
Changes to the talk slides
</commit_message>
<xml_diff>
--- a/JavascriptDS.pptx
+++ b/JavascriptDS.pptx
@@ -2,10 +2,10 @@
 <file path=ppt/presentation.xml><?xml version="1.0" encoding="utf-8"?>
 <p:presentation xmlns:a="http://schemas.openxmlformats.org/drawingml/2006/main" xmlns:r="http://schemas.openxmlformats.org/officeDocument/2006/relationships" xmlns:p="http://schemas.openxmlformats.org/presentationml/2006/main" saveSubsetFonts="1">
   <p:sldMasterIdLst>
-    <p:sldMasterId id="2147483648" r:id="rId1"/>
+    <p:sldMasterId id="2147483713" r:id="rId1"/>
   </p:sldMasterIdLst>
   <p:notesMasterIdLst>
-    <p:notesMasterId r:id="rId23"/>
+    <p:notesMasterId r:id="rId30"/>
   </p:notesMasterIdLst>
   <p:sldIdLst>
     <p:sldId id="256" r:id="rId2"/>
@@ -26,9 +26,16 @@
     <p:sldId id="273" r:id="rId17"/>
     <p:sldId id="274" r:id="rId18"/>
     <p:sldId id="275" r:id="rId19"/>
-    <p:sldId id="276" r:id="rId20"/>
-    <p:sldId id="260" r:id="rId21"/>
-    <p:sldId id="261" r:id="rId22"/>
+    <p:sldId id="277" r:id="rId20"/>
+    <p:sldId id="276" r:id="rId21"/>
+    <p:sldId id="260" r:id="rId22"/>
+    <p:sldId id="261" r:id="rId23"/>
+    <p:sldId id="278" r:id="rId24"/>
+    <p:sldId id="282" r:id="rId25"/>
+    <p:sldId id="279" r:id="rId26"/>
+    <p:sldId id="281" r:id="rId27"/>
+    <p:sldId id="280" r:id="rId28"/>
+    <p:sldId id="283" r:id="rId29"/>
   </p:sldIdLst>
   <p:sldSz cx="9144000" cy="6858000" type="screen4x3"/>
   <p:notesSz cx="6858000" cy="9144000"/>
@@ -212,7 +219,7 @@
           <a:p>
             <a:fld id="{CA2260C3-8739-944D-9E2A-5310CB64FC3F}" type="datetimeFigureOut">
               <a:rPr lang="en-US" smtClean="0"/>
-              <a:t>8/19/14</a:t>
+              <a:t>10/18/14</a:t>
             </a:fld>
             <a:endParaRPr lang="en-US"/>
           </a:p>
@@ -525,16 +532,24 @@
           <a:lstStyle/>
           <a:p>
             <a:r>
+              <a:rPr lang="en-US" dirty="0" smtClean="0"/>
+              <a:t>Hi , I am Rajesh Kumar, a software engineer at </a:t>
+            </a:r>
+            <a:r>
+              <a:rPr lang="en-US" dirty="0" err="1" smtClean="0"/>
+              <a:t>Uber</a:t>
+            </a:r>
+            <a:r>
+              <a:rPr lang="en-US" dirty="0" smtClean="0"/>
+              <a:t>. Today I am going to talk about using data structures with </a:t>
+            </a:r>
+            <a:r>
               <a:rPr lang="en-US" dirty="0" err="1" smtClean="0"/>
               <a:t>Javascript</a:t>
             </a:r>
             <a:r>
               <a:rPr lang="en-US" dirty="0" smtClean="0"/>
-              <a:t> is now used as</a:t>
-            </a:r>
-            <a:r>
-              <a:rPr lang="en-US" baseline="0" dirty="0" smtClean="0"/>
-              <a:t> backend language(Node), and for visualization (D3). Understanding of data structures is necessary to write efficient programs</a:t>
+              <a:t>.</a:t>
             </a:r>
             <a:endParaRPr lang="en-US" dirty="0"/>
           </a:p>
@@ -557,7 +572,7 @@
           <a:p>
             <a:fld id="{DDD113EA-54FE-5C46-9D5A-E3717047D860}" type="slidenum">
               <a:rPr lang="en-US" smtClean="0"/>
-              <a:t>2</a:t>
+              <a:t>1</a:t>
             </a:fld>
             <a:endParaRPr lang="en-US"/>
           </a:p>
@@ -566,7 +581,7 @@
     </p:spTree>
     <p:extLst>
       <p:ext uri="{BB962C8B-B14F-4D97-AF65-F5344CB8AC3E}">
-        <p14:creationId xmlns:p14="http://schemas.microsoft.com/office/powerpoint/2010/main" val="1328562342"/>
+        <p14:creationId xmlns:p14="http://schemas.microsoft.com/office/powerpoint/2010/main" val="138942354"/>
       </p:ext>
     </p:extLst>
   </p:cSld>
@@ -622,46 +637,13 @@
           <a:p>
             <a:r>
               <a:rPr lang="en-US" dirty="0" smtClean="0"/>
-              <a:t>Heap Property</a:t>
+              <a:t>3</a:t>
             </a:r>
           </a:p>
           <a:p>
             <a:r>
               <a:rPr lang="en-US" dirty="0" smtClean="0"/>
-              <a:t>Finding</a:t>
-            </a:r>
-            <a:r>
-              <a:rPr lang="en-US" baseline="0" dirty="0" smtClean="0"/>
-              <a:t> smallest element</a:t>
-            </a:r>
-          </a:p>
-          <a:p>
-            <a:r>
-              <a:rPr lang="en-US" baseline="0" dirty="0" smtClean="0"/>
-              <a:t>Removing smallest element – </a:t>
-            </a:r>
-            <a:r>
-              <a:rPr lang="en-US" baseline="0" dirty="0" err="1" smtClean="0"/>
-              <a:t>reheapify</a:t>
-            </a:r>
-            <a:endParaRPr lang="en-US" baseline="0" dirty="0" smtClean="0"/>
-          </a:p>
-          <a:p>
-            <a:r>
-              <a:rPr lang="en-US" baseline="0" dirty="0" smtClean="0"/>
-              <a:t>Time complexity</a:t>
-            </a:r>
-          </a:p>
-          <a:p>
-            <a:r>
-              <a:rPr lang="en-US" baseline="0" dirty="0" smtClean="0"/>
-              <a:t>Inserting</a:t>
-            </a:r>
-          </a:p>
-          <a:p>
-            <a:r>
-              <a:rPr lang="en-US" baseline="0" dirty="0" smtClean="0"/>
-              <a:t>Priority Queue – implemented as binary heap</a:t>
+              <a:t>2</a:t>
             </a:r>
             <a:endParaRPr lang="en-US" dirty="0"/>
           </a:p>
@@ -684,6 +666,241 @@
           <a:p>
             <a:fld id="{DDD113EA-54FE-5C46-9D5A-E3717047D860}" type="slidenum">
               <a:rPr lang="en-US" smtClean="0"/>
+              <a:t>14</a:t>
+            </a:fld>
+            <a:endParaRPr lang="en-US"/>
+          </a:p>
+        </p:txBody>
+      </p:sp>
+    </p:spTree>
+    <p:extLst>
+      <p:ext uri="{BB962C8B-B14F-4D97-AF65-F5344CB8AC3E}">
+        <p14:creationId xmlns:p14="http://schemas.microsoft.com/office/powerpoint/2010/main" val="1322472227"/>
+      </p:ext>
+    </p:extLst>
+  </p:cSld>
+  <p:clrMapOvr>
+    <a:masterClrMapping/>
+  </p:clrMapOvr>
+</p:notes>
+</file>
+
+<file path=ppt/notesSlides/notesSlide11.xml><?xml version="1.0" encoding="utf-8"?>
+<p:notes xmlns:a="http://schemas.openxmlformats.org/drawingml/2006/main" xmlns:r="http://schemas.openxmlformats.org/officeDocument/2006/relationships" xmlns:p="http://schemas.openxmlformats.org/presentationml/2006/main">
+  <p:cSld>
+    <p:spTree>
+      <p:nvGrpSpPr>
+        <p:cNvPr id="1" name=""/>
+        <p:cNvGrpSpPr/>
+        <p:nvPr/>
+      </p:nvGrpSpPr>
+      <p:grpSpPr>
+        <a:xfrm>
+          <a:off x="0" y="0"/>
+          <a:ext cx="0" cy="0"/>
+          <a:chOff x="0" y="0"/>
+          <a:chExt cx="0" cy="0"/>
+        </a:xfrm>
+      </p:grpSpPr>
+      <p:sp>
+        <p:nvSpPr>
+          <p:cNvPr id="2" name="Slide Image Placeholder 1"/>
+          <p:cNvSpPr>
+            <a:spLocks noGrp="1" noRot="1" noChangeAspect="1"/>
+          </p:cNvSpPr>
+          <p:nvPr>
+            <p:ph type="sldImg"/>
+          </p:nvPr>
+        </p:nvSpPr>
+        <p:spPr/>
+      </p:sp>
+      <p:sp>
+        <p:nvSpPr>
+          <p:cNvPr id="3" name="Notes Placeholder 2"/>
+          <p:cNvSpPr>
+            <a:spLocks noGrp="1"/>
+          </p:cNvSpPr>
+          <p:nvPr>
+            <p:ph type="body" idx="1"/>
+          </p:nvPr>
+        </p:nvSpPr>
+        <p:spPr/>
+        <p:txBody>
+          <a:bodyPr/>
+          <a:lstStyle/>
+          <a:p>
+            <a:r>
+              <a:rPr lang="en-US" dirty="0" err="1" smtClean="0"/>
+              <a:t>Inorder</a:t>
+            </a:r>
+            <a:r>
+              <a:rPr lang="en-US" dirty="0" smtClean="0"/>
+              <a:t> traversal</a:t>
+            </a:r>
+          </a:p>
+          <a:p>
+            <a:r>
+              <a:rPr lang="en-US" dirty="0" smtClean="0"/>
+              <a:t>Binary</a:t>
+            </a:r>
+            <a:r>
+              <a:rPr lang="en-US" baseline="0" dirty="0" smtClean="0"/>
+              <a:t> search</a:t>
+            </a:r>
+          </a:p>
+          <a:p>
+            <a:r>
+              <a:rPr lang="en-US" baseline="0" dirty="0" smtClean="0"/>
+              <a:t>Time complexity</a:t>
+            </a:r>
+            <a:endParaRPr lang="en-US" dirty="0"/>
+          </a:p>
+        </p:txBody>
+      </p:sp>
+      <p:sp>
+        <p:nvSpPr>
+          <p:cNvPr id="4" name="Slide Number Placeholder 3"/>
+          <p:cNvSpPr>
+            <a:spLocks noGrp="1"/>
+          </p:cNvSpPr>
+          <p:nvPr>
+            <p:ph type="sldNum" sz="quarter" idx="10"/>
+          </p:nvPr>
+        </p:nvSpPr>
+        <p:spPr/>
+        <p:txBody>
+          <a:bodyPr/>
+          <a:lstStyle/>
+          <a:p>
+            <a:fld id="{DDD113EA-54FE-5C46-9D5A-E3717047D860}" type="slidenum">
+              <a:rPr lang="en-US" smtClean="0"/>
+              <a:t>17</a:t>
+            </a:fld>
+            <a:endParaRPr lang="en-US"/>
+          </a:p>
+        </p:txBody>
+      </p:sp>
+    </p:spTree>
+    <p:extLst>
+      <p:ext uri="{BB962C8B-B14F-4D97-AF65-F5344CB8AC3E}">
+        <p14:creationId xmlns:p14="http://schemas.microsoft.com/office/powerpoint/2010/main" val="702740266"/>
+      </p:ext>
+    </p:extLst>
+  </p:cSld>
+  <p:clrMapOvr>
+    <a:masterClrMapping/>
+  </p:clrMapOvr>
+</p:notes>
+</file>
+
+<file path=ppt/notesSlides/notesSlide12.xml><?xml version="1.0" encoding="utf-8"?>
+<p:notes xmlns:a="http://schemas.openxmlformats.org/drawingml/2006/main" xmlns:r="http://schemas.openxmlformats.org/officeDocument/2006/relationships" xmlns:p="http://schemas.openxmlformats.org/presentationml/2006/main">
+  <p:cSld>
+    <p:spTree>
+      <p:nvGrpSpPr>
+        <p:cNvPr id="1" name=""/>
+        <p:cNvGrpSpPr/>
+        <p:nvPr/>
+      </p:nvGrpSpPr>
+      <p:grpSpPr>
+        <a:xfrm>
+          <a:off x="0" y="0"/>
+          <a:ext cx="0" cy="0"/>
+          <a:chOff x="0" y="0"/>
+          <a:chExt cx="0" cy="0"/>
+        </a:xfrm>
+      </p:grpSpPr>
+      <p:sp>
+        <p:nvSpPr>
+          <p:cNvPr id="2" name="Slide Image Placeholder 1"/>
+          <p:cNvSpPr>
+            <a:spLocks noGrp="1" noRot="1" noChangeAspect="1"/>
+          </p:cNvSpPr>
+          <p:nvPr>
+            <p:ph type="sldImg"/>
+          </p:nvPr>
+        </p:nvSpPr>
+        <p:spPr/>
+      </p:sp>
+      <p:sp>
+        <p:nvSpPr>
+          <p:cNvPr id="3" name="Notes Placeholder 2"/>
+          <p:cNvSpPr>
+            <a:spLocks noGrp="1"/>
+          </p:cNvSpPr>
+          <p:nvPr>
+            <p:ph type="body" idx="1"/>
+          </p:nvPr>
+        </p:nvSpPr>
+        <p:spPr/>
+        <p:txBody>
+          <a:bodyPr/>
+          <a:lstStyle/>
+          <a:p>
+            <a:r>
+              <a:rPr lang="en-US" dirty="0" smtClean="0"/>
+              <a:t>Heap Property</a:t>
+            </a:r>
+          </a:p>
+          <a:p>
+            <a:r>
+              <a:rPr lang="en-US" dirty="0" smtClean="0"/>
+              <a:t>Finding</a:t>
+            </a:r>
+            <a:r>
+              <a:rPr lang="en-US" baseline="0" dirty="0" smtClean="0"/>
+              <a:t> smallest element</a:t>
+            </a:r>
+          </a:p>
+          <a:p>
+            <a:r>
+              <a:rPr lang="en-US" baseline="0" dirty="0" smtClean="0"/>
+              <a:t>Removing smallest element – </a:t>
+            </a:r>
+            <a:r>
+              <a:rPr lang="en-US" baseline="0" dirty="0" err="1" smtClean="0"/>
+              <a:t>reheapify</a:t>
+            </a:r>
+            <a:endParaRPr lang="en-US" baseline="0" dirty="0" smtClean="0"/>
+          </a:p>
+          <a:p>
+            <a:r>
+              <a:rPr lang="en-US" baseline="0" dirty="0" smtClean="0"/>
+              <a:t>Time complexity</a:t>
+            </a:r>
+          </a:p>
+          <a:p>
+            <a:r>
+              <a:rPr lang="en-US" baseline="0" dirty="0" smtClean="0"/>
+              <a:t>Inserting</a:t>
+            </a:r>
+          </a:p>
+          <a:p>
+            <a:r>
+              <a:rPr lang="en-US" baseline="0" dirty="0" smtClean="0"/>
+              <a:t>Priority Queue – implemented as binary heap</a:t>
+            </a:r>
+            <a:endParaRPr lang="en-US" dirty="0"/>
+          </a:p>
+        </p:txBody>
+      </p:sp>
+      <p:sp>
+        <p:nvSpPr>
+          <p:cNvPr id="4" name="Slide Number Placeholder 3"/>
+          <p:cNvSpPr>
+            <a:spLocks noGrp="1"/>
+          </p:cNvSpPr>
+          <p:nvPr>
+            <p:ph type="sldNum" sz="quarter" idx="10"/>
+          </p:nvPr>
+        </p:nvSpPr>
+        <p:spPr/>
+        <p:txBody>
+          <a:bodyPr/>
+          <a:lstStyle/>
+          <a:p>
+            <a:fld id="{DDD113EA-54FE-5C46-9D5A-E3717047D860}" type="slidenum">
+              <a:rPr lang="en-US" smtClean="0"/>
               <a:t>18</a:t>
             </a:fld>
             <a:endParaRPr lang="en-US"/>
@@ -694,6 +911,443 @@
     <p:extLst>
       <p:ext uri="{BB962C8B-B14F-4D97-AF65-F5344CB8AC3E}">
         <p14:creationId xmlns:p14="http://schemas.microsoft.com/office/powerpoint/2010/main" val="3996612225"/>
+      </p:ext>
+    </p:extLst>
+  </p:cSld>
+  <p:clrMapOvr>
+    <a:masterClrMapping/>
+  </p:clrMapOvr>
+</p:notes>
+</file>
+
+<file path=ppt/notesSlides/notesSlide13.xml><?xml version="1.0" encoding="utf-8"?>
+<p:notes xmlns:a="http://schemas.openxmlformats.org/drawingml/2006/main" xmlns:r="http://schemas.openxmlformats.org/officeDocument/2006/relationships" xmlns:p="http://schemas.openxmlformats.org/presentationml/2006/main">
+  <p:cSld>
+    <p:spTree>
+      <p:nvGrpSpPr>
+        <p:cNvPr id="1" name=""/>
+        <p:cNvGrpSpPr/>
+        <p:nvPr/>
+      </p:nvGrpSpPr>
+      <p:grpSpPr>
+        <a:xfrm>
+          <a:off x="0" y="0"/>
+          <a:ext cx="0" cy="0"/>
+          <a:chOff x="0" y="0"/>
+          <a:chExt cx="0" cy="0"/>
+        </a:xfrm>
+      </p:grpSpPr>
+      <p:sp>
+        <p:nvSpPr>
+          <p:cNvPr id="2" name="Slide Image Placeholder 1"/>
+          <p:cNvSpPr>
+            <a:spLocks noGrp="1" noRot="1" noChangeAspect="1"/>
+          </p:cNvSpPr>
+          <p:nvPr>
+            <p:ph type="sldImg"/>
+          </p:nvPr>
+        </p:nvSpPr>
+        <p:spPr/>
+      </p:sp>
+      <p:sp>
+        <p:nvSpPr>
+          <p:cNvPr id="3" name="Notes Placeholder 2"/>
+          <p:cNvSpPr>
+            <a:spLocks noGrp="1"/>
+          </p:cNvSpPr>
+          <p:nvPr>
+            <p:ph type="body" idx="1"/>
+          </p:nvPr>
+        </p:nvSpPr>
+        <p:spPr/>
+        <p:txBody>
+          <a:bodyPr/>
+          <a:lstStyle/>
+          <a:p>
+            <a:pPr marL="0" marR="0" indent="0" algn="l" defTabSz="457200" rtl="0" eaLnBrk="1" fontAlgn="auto" latinLnBrk="0" hangingPunct="1">
+              <a:lnSpc>
+                <a:spcPct val="100000"/>
+              </a:lnSpc>
+              <a:spcBef>
+                <a:spcPts val="0"/>
+              </a:spcBef>
+              <a:spcAft>
+                <a:spcPts val="0"/>
+              </a:spcAft>
+              <a:buClrTx/>
+              <a:buSzTx/>
+              <a:buFontTx/>
+              <a:buNone/>
+              <a:tabLst/>
+              <a:defRPr/>
+            </a:pPr>
+            <a:r>
+              <a:rPr lang="en-US" dirty="0" smtClean="0"/>
+              <a:t>What data structure can I apply – Map, Set, BST, Heap, Stack.</a:t>
+            </a:r>
+            <a:r>
+              <a:rPr lang="en-US" baseline="0" dirty="0" smtClean="0"/>
+              <a:t> Queue</a:t>
+            </a:r>
+            <a:r>
+              <a:rPr lang="en-US" dirty="0" smtClean="0"/>
+              <a:t>?</a:t>
+            </a:r>
+          </a:p>
+          <a:p>
+            <a:r>
+              <a:rPr lang="en-US" dirty="0" smtClean="0"/>
+              <a:t>Set</a:t>
+            </a:r>
+          </a:p>
+          <a:p>
+            <a:r>
+              <a:rPr lang="en-US" dirty="0" smtClean="0"/>
+              <a:t>Space Complexity</a:t>
+            </a:r>
+          </a:p>
+          <a:p>
+            <a:pPr marL="0" marR="0" indent="0" algn="l" defTabSz="457200" rtl="0" eaLnBrk="1" fontAlgn="auto" latinLnBrk="0" hangingPunct="1">
+              <a:lnSpc>
+                <a:spcPct val="100000"/>
+              </a:lnSpc>
+              <a:spcBef>
+                <a:spcPts val="0"/>
+              </a:spcBef>
+              <a:spcAft>
+                <a:spcPts val="0"/>
+              </a:spcAft>
+              <a:buClrTx/>
+              <a:buSzTx/>
+              <a:buFontTx/>
+              <a:buNone/>
+              <a:tabLst/>
+              <a:defRPr/>
+            </a:pPr>
+            <a:r>
+              <a:rPr lang="en-US" dirty="0" smtClean="0"/>
+              <a:t>Time Complexity</a:t>
+            </a:r>
+            <a:r>
+              <a:rPr lang="en-US" baseline="0" dirty="0" smtClean="0"/>
+              <a:t> - </a:t>
+            </a:r>
+            <a:r>
+              <a:rPr lang="en-US" dirty="0" smtClean="0"/>
+              <a:t>Array – will sorting help?</a:t>
+            </a:r>
+          </a:p>
+        </p:txBody>
+      </p:sp>
+      <p:sp>
+        <p:nvSpPr>
+          <p:cNvPr id="4" name="Slide Number Placeholder 3"/>
+          <p:cNvSpPr>
+            <a:spLocks noGrp="1"/>
+          </p:cNvSpPr>
+          <p:nvPr>
+            <p:ph type="sldNum" sz="quarter" idx="10"/>
+          </p:nvPr>
+        </p:nvSpPr>
+        <p:spPr/>
+        <p:txBody>
+          <a:bodyPr/>
+          <a:lstStyle/>
+          <a:p>
+            <a:fld id="{DDD113EA-54FE-5C46-9D5A-E3717047D860}" type="slidenum">
+              <a:rPr lang="en-US" smtClean="0"/>
+              <a:t>23</a:t>
+            </a:fld>
+            <a:endParaRPr lang="en-US"/>
+          </a:p>
+        </p:txBody>
+      </p:sp>
+    </p:spTree>
+    <p:extLst>
+      <p:ext uri="{BB962C8B-B14F-4D97-AF65-F5344CB8AC3E}">
+        <p14:creationId xmlns:p14="http://schemas.microsoft.com/office/powerpoint/2010/main" val="3426923460"/>
+      </p:ext>
+    </p:extLst>
+  </p:cSld>
+  <p:clrMapOvr>
+    <a:masterClrMapping/>
+  </p:clrMapOvr>
+</p:notes>
+</file>
+
+<file path=ppt/notesSlides/notesSlide14.xml><?xml version="1.0" encoding="utf-8"?>
+<p:notes xmlns:a="http://schemas.openxmlformats.org/drawingml/2006/main" xmlns:r="http://schemas.openxmlformats.org/officeDocument/2006/relationships" xmlns:p="http://schemas.openxmlformats.org/presentationml/2006/main">
+  <p:cSld>
+    <p:spTree>
+      <p:nvGrpSpPr>
+        <p:cNvPr id="1" name=""/>
+        <p:cNvGrpSpPr/>
+        <p:nvPr/>
+      </p:nvGrpSpPr>
+      <p:grpSpPr>
+        <a:xfrm>
+          <a:off x="0" y="0"/>
+          <a:ext cx="0" cy="0"/>
+          <a:chOff x="0" y="0"/>
+          <a:chExt cx="0" cy="0"/>
+        </a:xfrm>
+      </p:grpSpPr>
+      <p:sp>
+        <p:nvSpPr>
+          <p:cNvPr id="2" name="Slide Image Placeholder 1"/>
+          <p:cNvSpPr>
+            <a:spLocks noGrp="1" noRot="1" noChangeAspect="1"/>
+          </p:cNvSpPr>
+          <p:nvPr>
+            <p:ph type="sldImg"/>
+          </p:nvPr>
+        </p:nvSpPr>
+        <p:spPr/>
+      </p:sp>
+      <p:sp>
+        <p:nvSpPr>
+          <p:cNvPr id="3" name="Notes Placeholder 2"/>
+          <p:cNvSpPr>
+            <a:spLocks noGrp="1"/>
+          </p:cNvSpPr>
+          <p:nvPr>
+            <p:ph type="body" idx="1"/>
+          </p:nvPr>
+        </p:nvSpPr>
+        <p:spPr/>
+        <p:txBody>
+          <a:bodyPr/>
+          <a:lstStyle/>
+          <a:p>
+            <a:r>
+              <a:rPr lang="en-US" dirty="0" smtClean="0"/>
+              <a:t>Stack</a:t>
+            </a:r>
+            <a:r>
+              <a:rPr lang="en-US" baseline="0" dirty="0" smtClean="0"/>
+              <a:t> </a:t>
+            </a:r>
+          </a:p>
+          <a:p>
+            <a:r>
+              <a:rPr lang="en-US" baseline="0" dirty="0" smtClean="0"/>
+              <a:t>Time complexity</a:t>
+            </a:r>
+            <a:endParaRPr lang="en-US" dirty="0"/>
+          </a:p>
+        </p:txBody>
+      </p:sp>
+      <p:sp>
+        <p:nvSpPr>
+          <p:cNvPr id="4" name="Slide Number Placeholder 3"/>
+          <p:cNvSpPr>
+            <a:spLocks noGrp="1"/>
+          </p:cNvSpPr>
+          <p:nvPr>
+            <p:ph type="sldNum" sz="quarter" idx="10"/>
+          </p:nvPr>
+        </p:nvSpPr>
+        <p:spPr/>
+        <p:txBody>
+          <a:bodyPr/>
+          <a:lstStyle/>
+          <a:p>
+            <a:fld id="{DDD113EA-54FE-5C46-9D5A-E3717047D860}" type="slidenum">
+              <a:rPr lang="en-US" smtClean="0"/>
+              <a:t>25</a:t>
+            </a:fld>
+            <a:endParaRPr lang="en-US"/>
+          </a:p>
+        </p:txBody>
+      </p:sp>
+    </p:spTree>
+    <p:extLst>
+      <p:ext uri="{BB962C8B-B14F-4D97-AF65-F5344CB8AC3E}">
+        <p14:creationId xmlns:p14="http://schemas.microsoft.com/office/powerpoint/2010/main" val="3269834832"/>
+      </p:ext>
+    </p:extLst>
+  </p:cSld>
+  <p:clrMapOvr>
+    <a:masterClrMapping/>
+  </p:clrMapOvr>
+</p:notes>
+</file>
+
+<file path=ppt/notesSlides/notesSlide15.xml><?xml version="1.0" encoding="utf-8"?>
+<p:notes xmlns:a="http://schemas.openxmlformats.org/drawingml/2006/main" xmlns:r="http://schemas.openxmlformats.org/officeDocument/2006/relationships" xmlns:p="http://schemas.openxmlformats.org/presentationml/2006/main">
+  <p:cSld>
+    <p:spTree>
+      <p:nvGrpSpPr>
+        <p:cNvPr id="1" name=""/>
+        <p:cNvGrpSpPr/>
+        <p:nvPr/>
+      </p:nvGrpSpPr>
+      <p:grpSpPr>
+        <a:xfrm>
+          <a:off x="0" y="0"/>
+          <a:ext cx="0" cy="0"/>
+          <a:chOff x="0" y="0"/>
+          <a:chExt cx="0" cy="0"/>
+        </a:xfrm>
+      </p:grpSpPr>
+      <p:sp>
+        <p:nvSpPr>
+          <p:cNvPr id="2" name="Slide Image Placeholder 1"/>
+          <p:cNvSpPr>
+            <a:spLocks noGrp="1" noRot="1" noChangeAspect="1"/>
+          </p:cNvSpPr>
+          <p:nvPr>
+            <p:ph type="sldImg"/>
+          </p:nvPr>
+        </p:nvSpPr>
+        <p:spPr/>
+      </p:sp>
+      <p:sp>
+        <p:nvSpPr>
+          <p:cNvPr id="3" name="Notes Placeholder 2"/>
+          <p:cNvSpPr>
+            <a:spLocks noGrp="1"/>
+          </p:cNvSpPr>
+          <p:nvPr>
+            <p:ph type="body" idx="1"/>
+          </p:nvPr>
+        </p:nvSpPr>
+        <p:spPr/>
+        <p:txBody>
+          <a:bodyPr/>
+          <a:lstStyle/>
+          <a:p>
+            <a:r>
+              <a:rPr lang="en-US" dirty="0" smtClean="0"/>
+              <a:t>Map</a:t>
+            </a:r>
+          </a:p>
+          <a:p>
+            <a:r>
+              <a:rPr lang="en-US" dirty="0" smtClean="0"/>
+              <a:t>Then sort by value</a:t>
+            </a:r>
+          </a:p>
+          <a:p>
+            <a:endParaRPr lang="en-US" dirty="0"/>
+          </a:p>
+        </p:txBody>
+      </p:sp>
+      <p:sp>
+        <p:nvSpPr>
+          <p:cNvPr id="4" name="Slide Number Placeholder 3"/>
+          <p:cNvSpPr>
+            <a:spLocks noGrp="1"/>
+          </p:cNvSpPr>
+          <p:nvPr>
+            <p:ph type="sldNum" sz="quarter" idx="10"/>
+          </p:nvPr>
+        </p:nvSpPr>
+        <p:spPr/>
+        <p:txBody>
+          <a:bodyPr/>
+          <a:lstStyle/>
+          <a:p>
+            <a:fld id="{DDD113EA-54FE-5C46-9D5A-E3717047D860}" type="slidenum">
+              <a:rPr lang="en-US" smtClean="0"/>
+              <a:t>26</a:t>
+            </a:fld>
+            <a:endParaRPr lang="en-US"/>
+          </a:p>
+        </p:txBody>
+      </p:sp>
+    </p:spTree>
+    <p:extLst>
+      <p:ext uri="{BB962C8B-B14F-4D97-AF65-F5344CB8AC3E}">
+        <p14:creationId xmlns:p14="http://schemas.microsoft.com/office/powerpoint/2010/main" val="2167082579"/>
+      </p:ext>
+    </p:extLst>
+  </p:cSld>
+  <p:clrMapOvr>
+    <a:masterClrMapping/>
+  </p:clrMapOvr>
+</p:notes>
+</file>
+
+<file path=ppt/notesSlides/notesSlide16.xml><?xml version="1.0" encoding="utf-8"?>
+<p:notes xmlns:a="http://schemas.openxmlformats.org/drawingml/2006/main" xmlns:r="http://schemas.openxmlformats.org/officeDocument/2006/relationships" xmlns:p="http://schemas.openxmlformats.org/presentationml/2006/main">
+  <p:cSld>
+    <p:spTree>
+      <p:nvGrpSpPr>
+        <p:cNvPr id="1" name=""/>
+        <p:cNvGrpSpPr/>
+        <p:nvPr/>
+      </p:nvGrpSpPr>
+      <p:grpSpPr>
+        <a:xfrm>
+          <a:off x="0" y="0"/>
+          <a:ext cx="0" cy="0"/>
+          <a:chOff x="0" y="0"/>
+          <a:chExt cx="0" cy="0"/>
+        </a:xfrm>
+      </p:grpSpPr>
+      <p:sp>
+        <p:nvSpPr>
+          <p:cNvPr id="2" name="Slide Image Placeholder 1"/>
+          <p:cNvSpPr>
+            <a:spLocks noGrp="1" noRot="1" noChangeAspect="1"/>
+          </p:cNvSpPr>
+          <p:nvPr>
+            <p:ph type="sldImg"/>
+          </p:nvPr>
+        </p:nvSpPr>
+        <p:spPr/>
+      </p:sp>
+      <p:sp>
+        <p:nvSpPr>
+          <p:cNvPr id="3" name="Notes Placeholder 2"/>
+          <p:cNvSpPr>
+            <a:spLocks noGrp="1"/>
+          </p:cNvSpPr>
+          <p:nvPr>
+            <p:ph type="body" idx="1"/>
+          </p:nvPr>
+        </p:nvSpPr>
+        <p:spPr/>
+        <p:txBody>
+          <a:bodyPr/>
+          <a:lstStyle/>
+          <a:p>
+            <a:r>
+              <a:rPr lang="en-US" dirty="0" smtClean="0"/>
+              <a:t>Heap</a:t>
+            </a:r>
+            <a:endParaRPr lang="en-US" dirty="0"/>
+          </a:p>
+        </p:txBody>
+      </p:sp>
+      <p:sp>
+        <p:nvSpPr>
+          <p:cNvPr id="4" name="Slide Number Placeholder 3"/>
+          <p:cNvSpPr>
+            <a:spLocks noGrp="1"/>
+          </p:cNvSpPr>
+          <p:nvPr>
+            <p:ph type="sldNum" sz="quarter" idx="10"/>
+          </p:nvPr>
+        </p:nvSpPr>
+        <p:spPr/>
+        <p:txBody>
+          <a:bodyPr/>
+          <a:lstStyle/>
+          <a:p>
+            <a:fld id="{DDD113EA-54FE-5C46-9D5A-E3717047D860}" type="slidenum">
+              <a:rPr lang="en-US" smtClean="0"/>
+              <a:t>27</a:t>
+            </a:fld>
+            <a:endParaRPr lang="en-US"/>
+          </a:p>
+        </p:txBody>
+      </p:sp>
+    </p:spTree>
+    <p:extLst>
+      <p:ext uri="{BB962C8B-B14F-4D97-AF65-F5344CB8AC3E}">
+        <p14:creationId xmlns:p14="http://schemas.microsoft.com/office/powerpoint/2010/main" val="1401787586"/>
       </p:ext>
     </p:extLst>
   </p:cSld>
@@ -748,34 +1402,28 @@
           <a:lstStyle/>
           <a:p>
             <a:r>
-              <a:rPr lang="en-US" sz="1200" kern="1200" dirty="0" smtClean="0">
-                <a:solidFill>
-                  <a:schemeClr val="tx1"/>
-                </a:solidFill>
-                <a:latin typeface="+mn-lt"/>
-                <a:ea typeface="+mn-ea"/>
-                <a:cs typeface="+mn-cs"/>
-              </a:rPr>
-              <a:t>0</a:t>
-            </a:r>
-          </a:p>
-          <a:p>
-            <a:r>
-              <a:rPr lang="en-US" sz="1200" kern="1200" dirty="0" smtClean="0">
-                <a:solidFill>
-                  <a:schemeClr val="tx1"/>
-                </a:solidFill>
-                <a:latin typeface="+mn-lt"/>
-                <a:ea typeface="+mn-ea"/>
-                <a:cs typeface="+mn-cs"/>
-              </a:rPr>
-              <a:t>101</a:t>
-            </a:r>
-          </a:p>
-          <a:p>
-            <a:r>
               <a:rPr lang="en-US" dirty="0" smtClean="0"/>
-              <a:t>    </a:t>
+              <a:t>I have talked to lot of front end engineers, and many of them have asked do we really need Data Structure knowledge for the front end development. </a:t>
+            </a:r>
+            <a:r>
+              <a:rPr lang="en-US" dirty="0" err="1" smtClean="0"/>
+              <a:t>Javascript</a:t>
+            </a:r>
+            <a:r>
+              <a:rPr lang="en-US" dirty="0" smtClean="0"/>
+              <a:t> </a:t>
+            </a:r>
+            <a:r>
+              <a:rPr lang="en-US" dirty="0" smtClean="0"/>
+              <a:t>is now used as</a:t>
+            </a:r>
+            <a:r>
+              <a:rPr lang="en-US" baseline="0" dirty="0" smtClean="0"/>
+              <a:t> backend language(Node), and for visualization (D3). Understanding of data structures is necessary to write efficient </a:t>
+            </a:r>
+            <a:r>
+              <a:rPr lang="en-US" baseline="0" dirty="0" smtClean="0"/>
+              <a:t>programs. And making sure that your applications are efficient and very responsive.</a:t>
             </a:r>
             <a:endParaRPr lang="en-US" dirty="0"/>
           </a:p>
@@ -798,7 +1446,7 @@
           <a:p>
             <a:fld id="{DDD113EA-54FE-5C46-9D5A-E3717047D860}" type="slidenum">
               <a:rPr lang="en-US" smtClean="0"/>
-              <a:t>5</a:t>
+              <a:t>2</a:t>
             </a:fld>
             <a:endParaRPr lang="en-US"/>
           </a:p>
@@ -807,7 +1455,7 @@
     </p:spTree>
     <p:extLst>
       <p:ext uri="{BB962C8B-B14F-4D97-AF65-F5344CB8AC3E}">
-        <p14:creationId xmlns:p14="http://schemas.microsoft.com/office/powerpoint/2010/main" val="322495437"/>
+        <p14:creationId xmlns:p14="http://schemas.microsoft.com/office/powerpoint/2010/main" val="1328562342"/>
       </p:ext>
     </p:extLst>
   </p:cSld>
@@ -862,28 +1510,16 @@
           <a:lstStyle/>
           <a:p>
             <a:r>
-              <a:rPr lang="fr-FR" sz="1200" kern="1200" dirty="0" smtClean="0">
-                <a:solidFill>
-                  <a:schemeClr val="tx1"/>
-                </a:solidFill>
-                <a:latin typeface="+mn-lt"/>
-                <a:ea typeface="+mn-ea"/>
-                <a:cs typeface="+mn-cs"/>
-              </a:rPr>
-              <a:t>index 0=0</a:t>
-            </a:r>
-          </a:p>
-          <a:p>
-            <a:r>
-              <a:rPr lang="fr-FR" sz="1200" kern="1200" dirty="0" smtClean="0">
-                <a:solidFill>
-                  <a:schemeClr val="tx1"/>
-                </a:solidFill>
-                <a:latin typeface="+mn-lt"/>
-                <a:ea typeface="+mn-ea"/>
-                <a:cs typeface="+mn-cs"/>
-              </a:rPr>
-              <a:t>index 1000=1000</a:t>
+              <a:rPr lang="en-US" dirty="0" smtClean="0"/>
+              <a:t>If there</a:t>
+            </a:r>
+            <a:r>
+              <a:rPr lang="en-US" baseline="0" dirty="0" smtClean="0"/>
+              <a:t> is one thing which you could take from this talk is this slide, if you understand this I would be satisfied that I have done my </a:t>
+            </a:r>
+            <a:r>
+              <a:rPr lang="en-US" baseline="0" smtClean="0"/>
+              <a:t>job today.</a:t>
             </a:r>
             <a:endParaRPr lang="en-US" dirty="0"/>
           </a:p>
@@ -906,7 +1542,7 @@
           <a:p>
             <a:fld id="{DDD113EA-54FE-5C46-9D5A-E3717047D860}" type="slidenum">
               <a:rPr lang="en-US" smtClean="0"/>
-              <a:t>6</a:t>
+              <a:t>3</a:t>
             </a:fld>
             <a:endParaRPr lang="en-US"/>
           </a:p>
@@ -915,7 +1551,7 @@
     </p:spTree>
     <p:extLst>
       <p:ext uri="{BB962C8B-B14F-4D97-AF65-F5344CB8AC3E}">
-        <p14:creationId xmlns:p14="http://schemas.microsoft.com/office/powerpoint/2010/main" val="1478316353"/>
+        <p14:creationId xmlns:p14="http://schemas.microsoft.com/office/powerpoint/2010/main" val="858323686"/>
       </p:ext>
     </p:extLst>
   </p:cSld>
@@ -991,46 +1627,13 @@
                 <a:ea typeface="+mn-ea"/>
                 <a:cs typeface="+mn-cs"/>
               </a:rPr>
-              <a:t>undefined</a:t>
-            </a:r>
-          </a:p>
-          <a:p>
-            <a:r>
-              <a:rPr lang="en-US" sz="1200" kern="1200" dirty="0" smtClean="0">
-                <a:solidFill>
-                  <a:schemeClr val="tx1"/>
-                </a:solidFill>
-                <a:latin typeface="+mn-lt"/>
-                <a:ea typeface="+mn-ea"/>
-                <a:cs typeface="+mn-cs"/>
-              </a:rPr>
-              <a:t>undefined</a:t>
-            </a:r>
-          </a:p>
-          <a:p>
-            <a:r>
-              <a:rPr lang="en-US" sz="1200" kern="1200" dirty="0" smtClean="0">
-                <a:solidFill>
-                  <a:schemeClr val="tx1"/>
-                </a:solidFill>
-                <a:latin typeface="+mn-lt"/>
-                <a:ea typeface="+mn-ea"/>
-                <a:cs typeface="+mn-cs"/>
-              </a:rPr>
-              <a:t>…</a:t>
-            </a:r>
-          </a:p>
-          <a:p>
-            <a:r>
-              <a:rPr lang="en-US" sz="1200" kern="1200" dirty="0" smtClean="0">
-                <a:solidFill>
-                  <a:schemeClr val="tx1"/>
-                </a:solidFill>
-                <a:latin typeface="+mn-lt"/>
-                <a:ea typeface="+mn-ea"/>
-                <a:cs typeface="+mn-cs"/>
-              </a:rPr>
-              <a:t>1000</a:t>
+              <a:t>101</a:t>
+            </a:r>
+          </a:p>
+          <a:p>
+            <a:r>
+              <a:rPr lang="en-US" dirty="0" smtClean="0"/>
+              <a:t>    </a:t>
             </a:r>
             <a:endParaRPr lang="en-US" dirty="0"/>
           </a:p>
@@ -1053,7 +1656,7 @@
           <a:p>
             <a:fld id="{DDD113EA-54FE-5C46-9D5A-E3717047D860}" type="slidenum">
               <a:rPr lang="en-US" smtClean="0"/>
-              <a:t>7</a:t>
+              <a:t>5</a:t>
             </a:fld>
             <a:endParaRPr lang="en-US"/>
           </a:p>
@@ -1062,7 +1665,7 @@
     </p:spTree>
     <p:extLst>
       <p:ext uri="{BB962C8B-B14F-4D97-AF65-F5344CB8AC3E}">
-        <p14:creationId xmlns:p14="http://schemas.microsoft.com/office/powerpoint/2010/main" val="700577553"/>
+        <p14:creationId xmlns:p14="http://schemas.microsoft.com/office/powerpoint/2010/main" val="322495437"/>
       </p:ext>
     </p:extLst>
   </p:cSld>
@@ -1117,7 +1720,7 @@
           <a:lstStyle/>
           <a:p>
             <a:r>
-              <a:rPr lang="en-US" sz="1200" kern="1200" dirty="0" smtClean="0">
+              <a:rPr lang="fr-FR" sz="1200" kern="1200" dirty="0" smtClean="0">
                 <a:solidFill>
                   <a:schemeClr val="tx1"/>
                 </a:solidFill>
@@ -1125,10 +1728,12 @@
                 <a:ea typeface="+mn-ea"/>
                 <a:cs typeface="+mn-cs"/>
               </a:rPr>
-              <a:t>key=</a:t>
-            </a:r>
-            <a:r>
-              <a:rPr lang="en-US" sz="1200" kern="1200" dirty="0" err="1" smtClean="0">
+              <a:t>index 0=0</a:t>
+            </a:r>
+          </a:p>
+          <a:p>
+            <a:r>
+              <a:rPr lang="fr-FR" sz="1200" kern="1200" dirty="0" smtClean="0">
                 <a:solidFill>
                   <a:schemeClr val="tx1"/>
                 </a:solidFill>
@@ -1136,88 +1741,7 @@
                 <a:ea typeface="+mn-ea"/>
                 <a:cs typeface="+mn-cs"/>
               </a:rPr>
-              <a:t>san_francisco</a:t>
-            </a:r>
-            <a:r>
-              <a:rPr lang="en-US" sz="1200" kern="1200" dirty="0" smtClean="0">
-                <a:solidFill>
-                  <a:schemeClr val="tx1"/>
-                </a:solidFill>
-                <a:latin typeface="+mn-lt"/>
-                <a:ea typeface="+mn-ea"/>
-                <a:cs typeface="+mn-cs"/>
-              </a:rPr>
-              <a:t> value=CA</a:t>
-            </a:r>
-          </a:p>
-          <a:p>
-            <a:r>
-              <a:rPr lang="en-US" sz="1200" kern="1200" dirty="0" smtClean="0">
-                <a:solidFill>
-                  <a:schemeClr val="tx1"/>
-                </a:solidFill>
-                <a:latin typeface="+mn-lt"/>
-                <a:ea typeface="+mn-ea"/>
-                <a:cs typeface="+mn-cs"/>
-              </a:rPr>
-              <a:t>key=</a:t>
-            </a:r>
-            <a:r>
-              <a:rPr lang="en-US" sz="1200" kern="1200" dirty="0" err="1" smtClean="0">
-                <a:solidFill>
-                  <a:schemeClr val="tx1"/>
-                </a:solidFill>
-                <a:latin typeface="+mn-lt"/>
-                <a:ea typeface="+mn-ea"/>
-                <a:cs typeface="+mn-cs"/>
-              </a:rPr>
-              <a:t>seattle</a:t>
-            </a:r>
-            <a:r>
-              <a:rPr lang="en-US" sz="1200" kern="1200" dirty="0" smtClean="0">
-                <a:solidFill>
-                  <a:schemeClr val="tx1"/>
-                </a:solidFill>
-                <a:latin typeface="+mn-lt"/>
-                <a:ea typeface="+mn-ea"/>
-                <a:cs typeface="+mn-cs"/>
-              </a:rPr>
-              <a:t> value=WA</a:t>
-            </a:r>
-          </a:p>
-          <a:p>
-            <a:r>
-              <a:rPr lang="en-US" sz="1200" kern="1200" dirty="0" smtClean="0">
-                <a:solidFill>
-                  <a:schemeClr val="tx1"/>
-                </a:solidFill>
-                <a:latin typeface="+mn-lt"/>
-                <a:ea typeface="+mn-ea"/>
-                <a:cs typeface="+mn-cs"/>
-              </a:rPr>
-              <a:t>key=</a:t>
-            </a:r>
-            <a:r>
-              <a:rPr lang="en-US" sz="1200" kern="1200" dirty="0" err="1" smtClean="0">
-                <a:solidFill>
-                  <a:schemeClr val="tx1"/>
-                </a:solidFill>
-                <a:latin typeface="+mn-lt"/>
-                <a:ea typeface="+mn-ea"/>
-                <a:cs typeface="+mn-cs"/>
-              </a:rPr>
-              <a:t>portland</a:t>
-            </a:r>
-            <a:r>
-              <a:rPr lang="en-US" sz="1200" kern="1200" smtClean="0">
-                <a:solidFill>
-                  <a:schemeClr val="tx1"/>
-                </a:solidFill>
-                <a:latin typeface="+mn-lt"/>
-                <a:ea typeface="+mn-ea"/>
-                <a:cs typeface="+mn-cs"/>
-              </a:rPr>
-              <a:t> value=OR</a:t>
+              <a:t>index 1000=1000</a:t>
             </a:r>
             <a:endParaRPr lang="en-US" dirty="0"/>
           </a:p>
@@ -1240,7 +1764,7 @@
           <a:p>
             <a:fld id="{DDD113EA-54FE-5C46-9D5A-E3717047D860}" type="slidenum">
               <a:rPr lang="en-US" smtClean="0"/>
-              <a:t>10</a:t>
+              <a:t>6</a:t>
             </a:fld>
             <a:endParaRPr lang="en-US"/>
           </a:p>
@@ -1249,7 +1773,7 @@
     </p:spTree>
     <p:extLst>
       <p:ext uri="{BB962C8B-B14F-4D97-AF65-F5344CB8AC3E}">
-        <p14:creationId xmlns:p14="http://schemas.microsoft.com/office/powerpoint/2010/main" val="3082535588"/>
+        <p14:creationId xmlns:p14="http://schemas.microsoft.com/office/powerpoint/2010/main" val="1478316353"/>
       </p:ext>
     </p:extLst>
   </p:cSld>
@@ -1304,26 +1828,67 @@
           <a:lstStyle/>
           <a:p>
             <a:r>
-              <a:rPr lang="en-US" dirty="0" smtClean="0"/>
-              <a:t>4</a:t>
-            </a:r>
-          </a:p>
-          <a:p>
-            <a:r>
-              <a:rPr lang="en-US" dirty="0" smtClean="0"/>
-              <a:t>3</a:t>
-            </a:r>
-          </a:p>
-          <a:p>
-            <a:r>
-              <a:rPr lang="en-US" dirty="0" smtClean="0"/>
-              <a:t>2</a:t>
-            </a:r>
-          </a:p>
-          <a:p>
-            <a:r>
-              <a:rPr lang="en-US" dirty="0" smtClean="0"/>
-              <a:t>1</a:t>
+              <a:rPr lang="en-US" sz="1200" kern="1200" dirty="0" smtClean="0">
+                <a:solidFill>
+                  <a:schemeClr val="tx1"/>
+                </a:solidFill>
+                <a:latin typeface="+mn-lt"/>
+                <a:ea typeface="+mn-ea"/>
+                <a:cs typeface="+mn-cs"/>
+              </a:rPr>
+              <a:t>0</a:t>
+            </a:r>
+          </a:p>
+          <a:p>
+            <a:r>
+              <a:rPr lang="en-US" sz="1200" kern="1200" dirty="0" smtClean="0">
+                <a:solidFill>
+                  <a:schemeClr val="tx1"/>
+                </a:solidFill>
+                <a:latin typeface="+mn-lt"/>
+                <a:ea typeface="+mn-ea"/>
+                <a:cs typeface="+mn-cs"/>
+              </a:rPr>
+              <a:t>undefined</a:t>
+            </a:r>
+          </a:p>
+          <a:p>
+            <a:r>
+              <a:rPr lang="en-US" sz="1200" kern="1200" dirty="0" smtClean="0">
+                <a:solidFill>
+                  <a:schemeClr val="tx1"/>
+                </a:solidFill>
+                <a:latin typeface="+mn-lt"/>
+                <a:ea typeface="+mn-ea"/>
+                <a:cs typeface="+mn-cs"/>
+              </a:rPr>
+              <a:t>undefined</a:t>
+            </a:r>
+          </a:p>
+          <a:p>
+            <a:r>
+              <a:rPr lang="en-US" sz="1200" kern="1200" dirty="0" smtClean="0">
+                <a:solidFill>
+                  <a:schemeClr val="tx1"/>
+                </a:solidFill>
+                <a:latin typeface="+mn-lt"/>
+                <a:ea typeface="+mn-ea"/>
+                <a:cs typeface="+mn-cs"/>
+              </a:rPr>
+              <a:t>…</a:t>
+            </a:r>
+          </a:p>
+          <a:p>
+            <a:r>
+              <a:rPr lang="en-US" sz="1200" kern="1200" dirty="0" smtClean="0">
+                <a:solidFill>
+                  <a:schemeClr val="tx1"/>
+                </a:solidFill>
+                <a:latin typeface="+mn-lt"/>
+                <a:ea typeface="+mn-ea"/>
+                <a:cs typeface="+mn-cs"/>
+              </a:rPr>
+              <a:t>1000</a:t>
             </a:r>
             <a:endParaRPr lang="en-US" dirty="0"/>
           </a:p>
@@ -1346,7 +1911,7 @@
           <a:p>
             <a:fld id="{DDD113EA-54FE-5C46-9D5A-E3717047D860}" type="slidenum">
               <a:rPr lang="en-US" smtClean="0"/>
-              <a:t>12</a:t>
+              <a:t>7</a:t>
             </a:fld>
             <a:endParaRPr lang="en-US"/>
           </a:p>
@@ -1355,7 +1920,7 @@
     </p:spTree>
     <p:extLst>
       <p:ext uri="{BB962C8B-B14F-4D97-AF65-F5344CB8AC3E}">
-        <p14:creationId xmlns:p14="http://schemas.microsoft.com/office/powerpoint/2010/main" val="3473062745"/>
+        <p14:creationId xmlns:p14="http://schemas.microsoft.com/office/powerpoint/2010/main" val="700577553"/>
       </p:ext>
     </p:extLst>
   </p:cSld>
@@ -1410,28 +1975,109 @@
           <a:lstStyle/>
           <a:p>
             <a:r>
-              <a:rPr lang="en-US" dirty="0" smtClean="0"/>
-              <a:t>1</a:t>
-            </a:r>
-          </a:p>
-          <a:p>
-            <a:r>
-              <a:rPr lang="en-US" dirty="0" smtClean="0"/>
-              <a:t>2</a:t>
-            </a:r>
-          </a:p>
-          <a:p>
-            <a:r>
-              <a:rPr lang="en-US" dirty="0" smtClean="0"/>
-              <a:t>3</a:t>
-            </a:r>
-          </a:p>
-          <a:p>
-            <a:r>
-              <a:rPr lang="en-US" smtClean="0"/>
-              <a:t>4</a:t>
-            </a:r>
-            <a:endParaRPr lang="en-US"/>
+              <a:rPr lang="en-US" sz="1200" kern="1200" dirty="0" smtClean="0">
+                <a:solidFill>
+                  <a:schemeClr val="tx1"/>
+                </a:solidFill>
+                <a:latin typeface="+mn-lt"/>
+                <a:ea typeface="+mn-ea"/>
+                <a:cs typeface="+mn-cs"/>
+              </a:rPr>
+              <a:t>key=</a:t>
+            </a:r>
+            <a:r>
+              <a:rPr lang="en-US" sz="1200" kern="1200" dirty="0" err="1" smtClean="0">
+                <a:solidFill>
+                  <a:schemeClr val="tx1"/>
+                </a:solidFill>
+                <a:latin typeface="+mn-lt"/>
+                <a:ea typeface="+mn-ea"/>
+                <a:cs typeface="+mn-cs"/>
+              </a:rPr>
+              <a:t>san_francisco</a:t>
+            </a:r>
+            <a:r>
+              <a:rPr lang="en-US" sz="1200" kern="1200" dirty="0" smtClean="0">
+                <a:solidFill>
+                  <a:schemeClr val="tx1"/>
+                </a:solidFill>
+                <a:latin typeface="+mn-lt"/>
+                <a:ea typeface="+mn-ea"/>
+                <a:cs typeface="+mn-cs"/>
+              </a:rPr>
+              <a:t> value=CA</a:t>
+            </a:r>
+          </a:p>
+          <a:p>
+            <a:r>
+              <a:rPr lang="en-US" sz="1200" kern="1200" dirty="0" smtClean="0">
+                <a:solidFill>
+                  <a:schemeClr val="tx1"/>
+                </a:solidFill>
+                <a:latin typeface="+mn-lt"/>
+                <a:ea typeface="+mn-ea"/>
+                <a:cs typeface="+mn-cs"/>
+              </a:rPr>
+              <a:t>key=</a:t>
+            </a:r>
+            <a:r>
+              <a:rPr lang="en-US" sz="1200" kern="1200" dirty="0" err="1" smtClean="0">
+                <a:solidFill>
+                  <a:schemeClr val="tx1"/>
+                </a:solidFill>
+                <a:latin typeface="+mn-lt"/>
+                <a:ea typeface="+mn-ea"/>
+                <a:cs typeface="+mn-cs"/>
+              </a:rPr>
+              <a:t>seattle</a:t>
+            </a:r>
+            <a:r>
+              <a:rPr lang="en-US" sz="1200" kern="1200" dirty="0" smtClean="0">
+                <a:solidFill>
+                  <a:schemeClr val="tx1"/>
+                </a:solidFill>
+                <a:latin typeface="+mn-lt"/>
+                <a:ea typeface="+mn-ea"/>
+                <a:cs typeface="+mn-cs"/>
+              </a:rPr>
+              <a:t> value=WA</a:t>
+            </a:r>
+          </a:p>
+          <a:p>
+            <a:r>
+              <a:rPr lang="en-US" sz="1200" kern="1200" dirty="0" smtClean="0">
+                <a:solidFill>
+                  <a:schemeClr val="tx1"/>
+                </a:solidFill>
+                <a:latin typeface="+mn-lt"/>
+                <a:ea typeface="+mn-ea"/>
+                <a:cs typeface="+mn-cs"/>
+              </a:rPr>
+              <a:t>key=</a:t>
+            </a:r>
+            <a:r>
+              <a:rPr lang="en-US" sz="1200" kern="1200" dirty="0" err="1" smtClean="0">
+                <a:solidFill>
+                  <a:schemeClr val="tx1"/>
+                </a:solidFill>
+                <a:latin typeface="+mn-lt"/>
+                <a:ea typeface="+mn-ea"/>
+                <a:cs typeface="+mn-cs"/>
+              </a:rPr>
+              <a:t>portland</a:t>
+            </a:r>
+            <a:r>
+              <a:rPr lang="en-US" sz="1200" kern="1200" smtClean="0">
+                <a:solidFill>
+                  <a:schemeClr val="tx1"/>
+                </a:solidFill>
+                <a:latin typeface="+mn-lt"/>
+                <a:ea typeface="+mn-ea"/>
+                <a:cs typeface="+mn-cs"/>
+              </a:rPr>
+              <a:t> value=OR</a:t>
+            </a:r>
+            <a:endParaRPr lang="en-US" dirty="0"/>
           </a:p>
         </p:txBody>
       </p:sp>
@@ -1452,7 +2098,7 @@
           <a:p>
             <a:fld id="{DDD113EA-54FE-5C46-9D5A-E3717047D860}" type="slidenum">
               <a:rPr lang="en-US" smtClean="0"/>
-              <a:t>13</a:t>
+              <a:t>10</a:t>
             </a:fld>
             <a:endParaRPr lang="en-US"/>
           </a:p>
@@ -1461,7 +2107,7 @@
     </p:spTree>
     <p:extLst>
       <p:ext uri="{BB962C8B-B14F-4D97-AF65-F5344CB8AC3E}">
-        <p14:creationId xmlns:p14="http://schemas.microsoft.com/office/powerpoint/2010/main" val="91629965"/>
+        <p14:creationId xmlns:p14="http://schemas.microsoft.com/office/powerpoint/2010/main" val="3082535588"/>
       </p:ext>
     </p:extLst>
   </p:cSld>
@@ -1517,6 +2163,12 @@
           <a:p>
             <a:r>
               <a:rPr lang="en-US" dirty="0" smtClean="0"/>
+              <a:t>4</a:t>
+            </a:r>
+          </a:p>
+          <a:p>
+            <a:r>
+              <a:rPr lang="en-US" dirty="0" smtClean="0"/>
               <a:t>3</a:t>
             </a:r>
           </a:p>
@@ -1524,6 +2176,12 @@
             <a:r>
               <a:rPr lang="en-US" dirty="0" smtClean="0"/>
               <a:t>2</a:t>
+            </a:r>
+          </a:p>
+          <a:p>
+            <a:r>
+              <a:rPr lang="en-US" dirty="0" smtClean="0"/>
+              <a:t>1</a:t>
             </a:r>
             <a:endParaRPr lang="en-US" dirty="0"/>
           </a:p>
@@ -1546,7 +2204,7 @@
           <a:p>
             <a:fld id="{DDD113EA-54FE-5C46-9D5A-E3717047D860}" type="slidenum">
               <a:rPr lang="en-US" smtClean="0"/>
-              <a:t>14</a:t>
+              <a:t>12</a:t>
             </a:fld>
             <a:endParaRPr lang="en-US"/>
           </a:p>
@@ -1555,7 +2213,7 @@
     </p:spTree>
     <p:extLst>
       <p:ext uri="{BB962C8B-B14F-4D97-AF65-F5344CB8AC3E}">
-        <p14:creationId xmlns:p14="http://schemas.microsoft.com/office/powerpoint/2010/main" val="1322472227"/>
+        <p14:creationId xmlns:p14="http://schemas.microsoft.com/office/powerpoint/2010/main" val="3473062745"/>
       </p:ext>
     </p:extLst>
   </p:cSld>
@@ -1610,30 +2268,28 @@
           <a:lstStyle/>
           <a:p>
             <a:r>
-              <a:rPr lang="en-US" dirty="0" err="1" smtClean="0"/>
-              <a:t>Inorder</a:t>
-            </a:r>
-            <a:r>
               <a:rPr lang="en-US" dirty="0" smtClean="0"/>
-              <a:t> traversal</a:t>
+              <a:t>1</a:t>
             </a:r>
           </a:p>
           <a:p>
             <a:r>
               <a:rPr lang="en-US" dirty="0" smtClean="0"/>
-              <a:t>Binary</a:t>
-            </a:r>
-            <a:r>
-              <a:rPr lang="en-US" baseline="0" dirty="0" smtClean="0"/>
-              <a:t> search</a:t>
-            </a:r>
-          </a:p>
-          <a:p>
-            <a:r>
-              <a:rPr lang="en-US" baseline="0" dirty="0" smtClean="0"/>
-              <a:t>Time complexity</a:t>
-            </a:r>
-            <a:endParaRPr lang="en-US" dirty="0"/>
+              <a:t>2</a:t>
+            </a:r>
+          </a:p>
+          <a:p>
+            <a:r>
+              <a:rPr lang="en-US" dirty="0" smtClean="0"/>
+              <a:t>3</a:t>
+            </a:r>
+          </a:p>
+          <a:p>
+            <a:r>
+              <a:rPr lang="en-US" smtClean="0"/>
+              <a:t>4</a:t>
+            </a:r>
+            <a:endParaRPr lang="en-US"/>
           </a:p>
         </p:txBody>
       </p:sp>
@@ -1654,7 +2310,7 @@
           <a:p>
             <a:fld id="{DDD113EA-54FE-5C46-9D5A-E3717047D860}" type="slidenum">
               <a:rPr lang="en-US" smtClean="0"/>
-              <a:t>17</a:t>
+              <a:t>13</a:t>
             </a:fld>
             <a:endParaRPr lang="en-US"/>
           </a:p>
@@ -1663,7 +2319,7 @@
     </p:spTree>
     <p:extLst>
       <p:ext uri="{BB962C8B-B14F-4D97-AF65-F5344CB8AC3E}">
-        <p14:creationId xmlns:p14="http://schemas.microsoft.com/office/powerpoint/2010/main" val="702740266"/>
+        <p14:creationId xmlns:p14="http://schemas.microsoft.com/office/powerpoint/2010/main" val="91629965"/>
       </p:ext>
     </p:extLst>
   </p:cSld>
@@ -1702,28 +2358,19 @@
         </p:nvSpPr>
         <p:spPr>
           <a:xfrm>
-            <a:off x="685800" y="609601"/>
-            <a:ext cx="7772400" cy="4267200"/>
+            <a:off x="685800" y="2130425"/>
+            <a:ext cx="7772400" cy="1470025"/>
           </a:xfrm>
         </p:spPr>
         <p:txBody>
-          <a:bodyPr anchor="b">
-            <a:noAutofit/>
-          </a:bodyPr>
-          <a:lstStyle>
-            <a:lvl1pPr>
-              <a:lnSpc>
-                <a:spcPct val="100000"/>
-              </a:lnSpc>
-              <a:defRPr sz="8000"/>
-            </a:lvl1pPr>
-          </a:lstStyle>
+          <a:bodyPr/>
+          <a:lstStyle/>
           <a:p>
             <a:r>
               <a:rPr lang="en-US" smtClean="0"/>
               <a:t>Click to edit Master title style</a:t>
             </a:r>
-            <a:endParaRPr lang="en-US" dirty="0"/>
+            <a:endParaRPr lang="en-US"/>
           </a:p>
         </p:txBody>
       </p:sp>
@@ -1739,18 +2386,16 @@
         </p:nvSpPr>
         <p:spPr>
           <a:xfrm>
-            <a:off x="1371600" y="4953000"/>
-            <a:ext cx="6400800" cy="1219200"/>
+            <a:off x="1371600" y="3886200"/>
+            <a:ext cx="6400800" cy="1752600"/>
           </a:xfrm>
         </p:spPr>
         <p:txBody>
-          <a:bodyPr>
-            <a:normAutofit/>
-          </a:bodyPr>
+          <a:bodyPr/>
           <a:lstStyle>
             <a:lvl1pPr marL="0" indent="0" algn="ctr">
               <a:buNone/>
-              <a:defRPr sz="2400">
+              <a:defRPr>
                 <a:solidFill>
                   <a:schemeClr val="tx1">
                     <a:tint val="75000"/>
@@ -1844,13 +2489,13 @@
               <a:rPr lang="en-US" smtClean="0"/>
               <a:t>Click to edit Master subtitle style</a:t>
             </a:r>
-            <a:endParaRPr lang="en-US" dirty="0"/>
+            <a:endParaRPr lang="en-US"/>
           </a:p>
         </p:txBody>
       </p:sp>
       <p:sp>
         <p:nvSpPr>
-          <p:cNvPr id="7" name="Date Placeholder 6"/>
+          <p:cNvPr id="4" name="Date Placeholder 3"/>
           <p:cNvSpPr>
             <a:spLocks noGrp="1"/>
           </p:cNvSpPr>
@@ -1865,7 +2510,7 @@
           <a:p>
             <a:fld id="{216C5678-EE20-4FA5-88E2-6E0BD67A2E26}" type="datetime1">
               <a:rPr lang="en-US" smtClean="0"/>
-              <a:t>8/19/14</a:t>
+              <a:t>10/18/14</a:t>
             </a:fld>
             <a:endParaRPr lang="en-US" dirty="0"/>
           </a:p>
@@ -1873,12 +2518,35 @@
       </p:sp>
       <p:sp>
         <p:nvSpPr>
-          <p:cNvPr id="8" name="Slide Number Placeholder 7"/>
+          <p:cNvPr id="5" name="Footer Placeholder 4"/>
           <p:cNvSpPr>
             <a:spLocks noGrp="1"/>
           </p:cNvSpPr>
           <p:nvPr>
-            <p:ph type="sldNum" sz="quarter" idx="11"/>
+            <p:ph type="ftr" sz="quarter" idx="11"/>
+          </p:nvPr>
+        </p:nvSpPr>
+        <p:spPr/>
+        <p:txBody>
+          <a:bodyPr/>
+          <a:lstStyle/>
+          <a:p>
+            <a:r>
+              <a:rPr lang="en-US" smtClean="0"/>
+              <a:t>Footer Text</a:t>
+            </a:r>
+            <a:endParaRPr lang="en-US" dirty="0"/>
+          </a:p>
+        </p:txBody>
+      </p:sp>
+      <p:sp>
+        <p:nvSpPr>
+          <p:cNvPr id="6" name="Slide Number Placeholder 5"/>
+          <p:cNvSpPr>
+            <a:spLocks noGrp="1"/>
+          </p:cNvSpPr>
+          <p:nvPr>
+            <p:ph type="sldNum" sz="quarter" idx="12"/>
           </p:nvPr>
         </p:nvSpPr>
         <p:spPr/>
@@ -1895,30 +2563,12 @@
           </a:p>
         </p:txBody>
       </p:sp>
-      <p:sp>
-        <p:nvSpPr>
-          <p:cNvPr id="9" name="Footer Placeholder 8"/>
-          <p:cNvSpPr>
-            <a:spLocks noGrp="1"/>
-          </p:cNvSpPr>
-          <p:nvPr>
-            <p:ph type="ftr" sz="quarter" idx="12"/>
-          </p:nvPr>
-        </p:nvSpPr>
-        <p:spPr/>
-        <p:txBody>
-          <a:bodyPr/>
-          <a:lstStyle/>
-          <a:p>
-            <a:r>
-              <a:rPr lang="en-US" smtClean="0"/>
-              <a:t>Footer Text</a:t>
-            </a:r>
-            <a:endParaRPr lang="en-US" dirty="0"/>
-          </a:p>
-        </p:txBody>
-      </p:sp>
     </p:spTree>
+    <p:extLst>
+      <p:ext uri="{BB962C8B-B14F-4D97-AF65-F5344CB8AC3E}">
+        <p14:creationId xmlns:p14="http://schemas.microsoft.com/office/powerpoint/2010/main" val="4049943228"/>
+      </p:ext>
+    </p:extLst>
   </p:cSld>
   <p:clrMapOvr>
     <a:masterClrMapping/>
@@ -1962,7 +2612,7 @@
               <a:rPr lang="en-US" smtClean="0"/>
               <a:t>Click to edit Master title style</a:t>
             </a:r>
-            <a:endParaRPr lang="en-US" dirty="0"/>
+            <a:endParaRPr lang="en-US"/>
           </a:p>
         </p:txBody>
       </p:sp>
@@ -2035,7 +2685,7 @@
           <a:p>
             <a:fld id="{EA051B39-B140-43FE-96DB-472A2B59CE7C}" type="datetime1">
               <a:rPr lang="en-US" smtClean="0"/>
-              <a:t>8/19/14</a:t>
+              <a:t>10/18/14</a:t>
             </a:fld>
             <a:endParaRPr lang="en-US"/>
           </a:p>
@@ -2089,6 +2739,11 @@
         </p:txBody>
       </p:sp>
     </p:spTree>
+    <p:extLst>
+      <p:ext uri="{BB962C8B-B14F-4D97-AF65-F5344CB8AC3E}">
+        <p14:creationId xmlns:p14="http://schemas.microsoft.com/office/powerpoint/2010/main" val="2350557435"/>
+      </p:ext>
+    </p:extLst>
   </p:cSld>
   <p:clrMapOvr>
     <a:masterClrMapping/>
@@ -2137,7 +2792,7 @@
               <a:rPr lang="en-US" smtClean="0"/>
               <a:t>Click to edit Master title style</a:t>
             </a:r>
-            <a:endParaRPr lang="en-US" dirty="0"/>
+            <a:endParaRPr lang="en-US"/>
           </a:p>
         </p:txBody>
       </p:sp>
@@ -2215,7 +2870,7 @@
           <a:p>
             <a:fld id="{DA600BB2-27C5-458B-ABCE-839C88CF47CE}" type="datetime1">
               <a:rPr lang="en-US" smtClean="0"/>
-              <a:t>8/19/14</a:t>
+              <a:t>10/18/14</a:t>
             </a:fld>
             <a:endParaRPr lang="en-US"/>
           </a:p>
@@ -2269,6 +2924,11 @@
         </p:txBody>
       </p:sp>
     </p:spTree>
+    <p:extLst>
+      <p:ext uri="{BB962C8B-B14F-4D97-AF65-F5344CB8AC3E}">
+        <p14:creationId xmlns:p14="http://schemas.microsoft.com/office/powerpoint/2010/main" val="1249088608"/>
+      </p:ext>
+    </p:extLst>
   </p:cSld>
   <p:clrMapOvr>
     <a:masterClrMapping/>
@@ -2312,7 +2972,7 @@
               <a:rPr lang="en-US" smtClean="0"/>
               <a:t>Click to edit Master title style</a:t>
             </a:r>
-            <a:endParaRPr lang="en-US" dirty="0"/>
+            <a:endParaRPr lang="en-US"/>
           </a:p>
         </p:txBody>
       </p:sp>
@@ -2329,25 +2989,7 @@
         <p:spPr/>
         <p:txBody>
           <a:bodyPr/>
-          <a:lstStyle>
-            <a:lvl5pPr>
-              <a:defRPr/>
-            </a:lvl5pPr>
-            <a:lvl6pPr>
-              <a:defRPr/>
-            </a:lvl6pPr>
-            <a:lvl7pPr>
-              <a:defRPr/>
-            </a:lvl7pPr>
-            <a:lvl8pPr>
-              <a:defRPr/>
-            </a:lvl8pPr>
-            <a:lvl9pPr>
-              <a:buFont typeface="Arial" pitchFamily="34" charset="0"/>
-              <a:buChar char="•"/>
-              <a:defRPr/>
-            </a:lvl9pPr>
-          </a:lstStyle>
+          <a:lstStyle/>
           <a:p>
             <a:pPr lvl="0"/>
             <a:r>
@@ -2382,7 +3024,7 @@
               <a:rPr lang="en-US" smtClean="0"/>
               <a:t>Fifth level</a:t>
             </a:r>
-            <a:endParaRPr lang="en-US" dirty="0" smtClean="0"/>
+            <a:endParaRPr lang="en-US"/>
           </a:p>
         </p:txBody>
       </p:sp>
@@ -2403,7 +3045,7 @@
           <a:p>
             <a:fld id="{B11D738E-8962-435F-8C43-147B8DD7E819}" type="datetime1">
               <a:rPr lang="en-US" smtClean="0"/>
-              <a:t>8/19/14</a:t>
+              <a:t>10/18/14</a:t>
             </a:fld>
             <a:endParaRPr lang="en-US"/>
           </a:p>
@@ -2457,6 +3099,11 @@
         </p:txBody>
       </p:sp>
     </p:spTree>
+    <p:extLst>
+      <p:ext uri="{BB962C8B-B14F-4D97-AF65-F5344CB8AC3E}">
+        <p14:creationId xmlns:p14="http://schemas.microsoft.com/office/powerpoint/2010/main" val="244843997"/>
+      </p:ext>
+    </p:extLst>
   </p:cSld>
   <p:clrMapOvr>
     <a:masterClrMapping/>
@@ -2493,36 +3140,15 @@
         </p:nvSpPr>
         <p:spPr>
           <a:xfrm>
-            <a:off x="722313" y="1371600"/>
-            <a:ext cx="7772400" cy="2505075"/>
+            <a:off x="722313" y="4406900"/>
+            <a:ext cx="7772400" cy="1362075"/>
           </a:xfrm>
         </p:spPr>
         <p:txBody>
-          <a:bodyPr anchor="b"/>
+          <a:bodyPr anchor="t"/>
           <a:lstStyle>
-            <a:lvl1pPr algn="ctr" defTabSz="914400" rtl="0" eaLnBrk="1" latinLnBrk="0" hangingPunct="1">
-              <a:lnSpc>
-                <a:spcPct val="100000"/>
-              </a:lnSpc>
-              <a:spcBef>
-                <a:spcPct val="0"/>
-              </a:spcBef>
-              <a:buNone/>
-              <a:defRPr lang="en-US" sz="4800" kern="1200" dirty="0" smtClean="0">
-                <a:solidFill>
-                  <a:schemeClr val="tx2"/>
-                </a:solidFill>
-                <a:effectLst>
-                  <a:outerShdw blurRad="63500" dist="38100" dir="5400000" algn="t" rotWithShape="0">
-                    <a:prstClr val="black">
-                      <a:alpha val="25000"/>
-                    </a:prstClr>
-                  </a:outerShdw>
-                </a:effectLst>
-                <a:latin typeface="+mn-lt"/>
-                <a:ea typeface="+mj-ea"/>
-                <a:cs typeface="+mj-cs"/>
-              </a:defRPr>
+            <a:lvl1pPr algn="l">
+              <a:defRPr sz="4000" b="1" cap="all"/>
             </a:lvl1pPr>
           </a:lstStyle>
           <a:p>
@@ -2530,7 +3156,7 @@
               <a:rPr lang="en-US" smtClean="0"/>
               <a:t>Click to edit Master title style</a:t>
             </a:r>
-            <a:endParaRPr lang="en-US" dirty="0"/>
+            <a:endParaRPr lang="en-US"/>
           </a:p>
         </p:txBody>
       </p:sp>
@@ -2546,14 +3172,14 @@
         </p:nvSpPr>
         <p:spPr>
           <a:xfrm>
-            <a:off x="722313" y="4068763"/>
-            <a:ext cx="7772400" cy="1131887"/>
+            <a:off x="722313" y="2906713"/>
+            <a:ext cx="7772400" cy="1500187"/>
           </a:xfrm>
         </p:spPr>
         <p:txBody>
-          <a:bodyPr anchor="t"/>
+          <a:bodyPr anchor="b"/>
           <a:lstStyle>
-            <a:lvl1pPr marL="0" indent="0" algn="ctr">
+            <a:lvl1pPr marL="0" indent="0">
               <a:buNone/>
               <a:defRPr sz="2000">
                 <a:solidFill>
@@ -2670,7 +3296,7 @@
           <a:p>
             <a:fld id="{09CAEA93-55E7-4DA9-90C2-089A26EEFEC4}" type="datetime1">
               <a:rPr lang="en-US" smtClean="0"/>
-              <a:t>8/19/14</a:t>
+              <a:t>10/18/14</a:t>
             </a:fld>
             <a:endParaRPr lang="en-US"/>
           </a:p>
@@ -2723,157 +3349,12 @@
           </a:p>
         </p:txBody>
       </p:sp>
-      <p:sp>
-        <p:nvSpPr>
-          <p:cNvPr id="7" name="Oval 6"/>
-          <p:cNvSpPr/>
-          <p:nvPr/>
-        </p:nvSpPr>
-        <p:spPr>
-          <a:xfrm>
-            <a:off x="4495800" y="3924300"/>
-            <a:ext cx="84772" cy="84772"/>
-          </a:xfrm>
-          <a:prstGeom prst="ellipse">
-            <a:avLst/>
-          </a:prstGeom>
-          <a:solidFill>
-            <a:schemeClr val="tx1">
-              <a:lumMod val="50000"/>
-              <a:lumOff val="50000"/>
-            </a:schemeClr>
-          </a:solidFill>
-          <a:ln w="12700">
-            <a:noFill/>
-          </a:ln>
-          <a:effectLst/>
-        </p:spPr>
-        <p:style>
-          <a:lnRef idx="2">
-            <a:schemeClr val="accent1">
-              <a:shade val="50000"/>
-            </a:schemeClr>
-          </a:lnRef>
-          <a:fillRef idx="1">
-            <a:schemeClr val="accent1"/>
-          </a:fillRef>
-          <a:effectRef idx="0">
-            <a:schemeClr val="accent1"/>
-          </a:effectRef>
-          <a:fontRef idx="minor">
-            <a:schemeClr val="lt1"/>
-          </a:fontRef>
-        </p:style>
-        <p:txBody>
-          <a:bodyPr rtlCol="0" anchor="ctr"/>
-          <a:lstStyle/>
-          <a:p>
-            <a:pPr algn="ctr"/>
-            <a:endParaRPr lang="en-US"/>
-          </a:p>
-        </p:txBody>
-      </p:sp>
-      <p:sp>
-        <p:nvSpPr>
-          <p:cNvPr id="8" name="Oval 7"/>
-          <p:cNvSpPr/>
-          <p:nvPr/>
-        </p:nvSpPr>
-        <p:spPr>
-          <a:xfrm>
-            <a:off x="4695825" y="3924300"/>
-            <a:ext cx="84772" cy="84772"/>
-          </a:xfrm>
-          <a:prstGeom prst="ellipse">
-            <a:avLst/>
-          </a:prstGeom>
-          <a:solidFill>
-            <a:schemeClr val="tx1">
-              <a:lumMod val="50000"/>
-              <a:lumOff val="50000"/>
-            </a:schemeClr>
-          </a:solidFill>
-          <a:ln w="12700">
-            <a:noFill/>
-          </a:ln>
-          <a:effectLst/>
-        </p:spPr>
-        <p:style>
-          <a:lnRef idx="2">
-            <a:schemeClr val="accent1">
-              <a:shade val="50000"/>
-            </a:schemeClr>
-          </a:lnRef>
-          <a:fillRef idx="1">
-            <a:schemeClr val="accent1"/>
-          </a:fillRef>
-          <a:effectRef idx="0">
-            <a:schemeClr val="accent1"/>
-          </a:effectRef>
-          <a:fontRef idx="minor">
-            <a:schemeClr val="lt1"/>
-          </a:fontRef>
-        </p:style>
-        <p:txBody>
-          <a:bodyPr rtlCol="0" anchor="ctr"/>
-          <a:lstStyle/>
-          <a:p>
-            <a:pPr algn="ctr"/>
-            <a:endParaRPr lang="en-US"/>
-          </a:p>
-        </p:txBody>
-      </p:sp>
-      <p:sp>
-        <p:nvSpPr>
-          <p:cNvPr id="9" name="Oval 8"/>
-          <p:cNvSpPr/>
-          <p:nvPr/>
-        </p:nvSpPr>
-        <p:spPr>
-          <a:xfrm>
-            <a:off x="4296728" y="3924300"/>
-            <a:ext cx="84772" cy="84772"/>
-          </a:xfrm>
-          <a:prstGeom prst="ellipse">
-            <a:avLst/>
-          </a:prstGeom>
-          <a:solidFill>
-            <a:schemeClr val="tx1">
-              <a:lumMod val="50000"/>
-              <a:lumOff val="50000"/>
-            </a:schemeClr>
-          </a:solidFill>
-          <a:ln w="12700">
-            <a:noFill/>
-          </a:ln>
-          <a:effectLst/>
-        </p:spPr>
-        <p:style>
-          <a:lnRef idx="2">
-            <a:schemeClr val="accent1">
-              <a:shade val="50000"/>
-            </a:schemeClr>
-          </a:lnRef>
-          <a:fillRef idx="1">
-            <a:schemeClr val="accent1"/>
-          </a:fillRef>
-          <a:effectRef idx="0">
-            <a:schemeClr val="accent1"/>
-          </a:effectRef>
-          <a:fontRef idx="minor">
-            <a:schemeClr val="lt1"/>
-          </a:fontRef>
-        </p:style>
-        <p:txBody>
-          <a:bodyPr rtlCol="0" anchor="ctr"/>
-          <a:lstStyle/>
-          <a:p>
-            <a:pPr algn="ctr"/>
-            <a:endParaRPr lang="en-US"/>
-          </a:p>
-        </p:txBody>
-      </p:sp>
     </p:spTree>
+    <p:extLst>
+      <p:ext uri="{BB962C8B-B14F-4D97-AF65-F5344CB8AC3E}">
+        <p14:creationId xmlns:p14="http://schemas.microsoft.com/office/powerpoint/2010/main" val="1846638542"/>
+      </p:ext>
+    </p:extLst>
   </p:cSld>
   <p:clrMapOvr>
     <a:masterClrMapping/>
@@ -2923,6 +3404,91 @@
       </p:sp>
       <p:sp>
         <p:nvSpPr>
+          <p:cNvPr id="3" name="Content Placeholder 2"/>
+          <p:cNvSpPr>
+            <a:spLocks noGrp="1"/>
+          </p:cNvSpPr>
+          <p:nvPr>
+            <p:ph sz="half" idx="1"/>
+          </p:nvPr>
+        </p:nvSpPr>
+        <p:spPr>
+          <a:xfrm>
+            <a:off x="457200" y="1600200"/>
+            <a:ext cx="4038600" cy="4525963"/>
+          </a:xfrm>
+        </p:spPr>
+        <p:txBody>
+          <a:bodyPr/>
+          <a:lstStyle>
+            <a:lvl1pPr>
+              <a:defRPr sz="2800"/>
+            </a:lvl1pPr>
+            <a:lvl2pPr>
+              <a:defRPr sz="2400"/>
+            </a:lvl2pPr>
+            <a:lvl3pPr>
+              <a:defRPr sz="2000"/>
+            </a:lvl3pPr>
+            <a:lvl4pPr>
+              <a:defRPr sz="1800"/>
+            </a:lvl4pPr>
+            <a:lvl5pPr>
+              <a:defRPr sz="1800"/>
+            </a:lvl5pPr>
+            <a:lvl6pPr>
+              <a:defRPr sz="1800"/>
+            </a:lvl6pPr>
+            <a:lvl7pPr>
+              <a:defRPr sz="1800"/>
+            </a:lvl7pPr>
+            <a:lvl8pPr>
+              <a:defRPr sz="1800"/>
+            </a:lvl8pPr>
+            <a:lvl9pPr>
+              <a:defRPr sz="1800"/>
+            </a:lvl9pPr>
+          </a:lstStyle>
+          <a:p>
+            <a:pPr lvl="0"/>
+            <a:r>
+              <a:rPr lang="en-US" smtClean="0"/>
+              <a:t>Click to edit Master text styles</a:t>
+            </a:r>
+          </a:p>
+          <a:p>
+            <a:pPr lvl="1"/>
+            <a:r>
+              <a:rPr lang="en-US" smtClean="0"/>
+              <a:t>Second level</a:t>
+            </a:r>
+          </a:p>
+          <a:p>
+            <a:pPr lvl="2"/>
+            <a:r>
+              <a:rPr lang="en-US" smtClean="0"/>
+              <a:t>Third level</a:t>
+            </a:r>
+          </a:p>
+          <a:p>
+            <a:pPr lvl="3"/>
+            <a:r>
+              <a:rPr lang="en-US" smtClean="0"/>
+              <a:t>Fourth level</a:t>
+            </a:r>
+          </a:p>
+          <a:p>
+            <a:pPr lvl="4"/>
+            <a:r>
+              <a:rPr lang="en-US" smtClean="0"/>
+              <a:t>Fifth level</a:t>
+            </a:r>
+            <a:endParaRPr lang="en-US"/>
+          </a:p>
+        </p:txBody>
+      </p:sp>
+      <p:sp>
+        <p:nvSpPr>
           <p:cNvPr id="4" name="Content Placeholder 3"/>
           <p:cNvSpPr>
             <a:spLocks noGrp="1"/>
@@ -2941,31 +3507,31 @@
           <a:bodyPr/>
           <a:lstStyle>
             <a:lvl1pPr>
-              <a:defRPr sz="2400"/>
+              <a:defRPr sz="2800"/>
             </a:lvl1pPr>
             <a:lvl2pPr>
-              <a:defRPr sz="1600"/>
+              <a:defRPr sz="2400"/>
             </a:lvl2pPr>
             <a:lvl3pPr>
-              <a:defRPr sz="1600"/>
+              <a:defRPr sz="2000"/>
             </a:lvl3pPr>
             <a:lvl4pPr>
-              <a:defRPr sz="1600"/>
+              <a:defRPr sz="1800"/>
             </a:lvl4pPr>
             <a:lvl5pPr>
-              <a:defRPr sz="1600"/>
+              <a:defRPr sz="1800"/>
             </a:lvl5pPr>
             <a:lvl6pPr>
-              <a:defRPr sz="1600"/>
+              <a:defRPr sz="1800"/>
             </a:lvl6pPr>
             <a:lvl7pPr>
-              <a:defRPr sz="1600"/>
+              <a:defRPr sz="1800"/>
             </a:lvl7pPr>
             <a:lvl8pPr>
-              <a:defRPr sz="1600"/>
+              <a:defRPr sz="1800"/>
             </a:lvl8pPr>
             <a:lvl9pPr>
-              <a:defRPr sz="1600"/>
+              <a:defRPr sz="1800"/>
             </a:lvl9pPr>
           </a:lstStyle>
           <a:p>
@@ -3002,7 +3568,7 @@
               <a:rPr lang="en-US" smtClean="0"/>
               <a:t>Fifth level</a:t>
             </a:r>
-            <a:endParaRPr lang="en-US" dirty="0" smtClean="0"/>
+            <a:endParaRPr lang="en-US"/>
           </a:p>
         </p:txBody>
       </p:sp>
@@ -3023,7 +3589,7 @@
           <a:p>
             <a:fld id="{E34CF3C7-6809-4F39-BD67-A75817BDDE0A}" type="datetime1">
               <a:rPr lang="en-US" smtClean="0"/>
-              <a:t>8/19/14</a:t>
+              <a:t>10/18/14</a:t>
             </a:fld>
             <a:endParaRPr lang="en-US"/>
           </a:p>
@@ -3076,64 +3642,12 @@
           </a:p>
         </p:txBody>
       </p:sp>
-      <p:sp>
-        <p:nvSpPr>
-          <p:cNvPr id="9" name="Content Placeholder 8"/>
-          <p:cNvSpPr>
-            <a:spLocks noGrp="1"/>
-          </p:cNvSpPr>
-          <p:nvPr>
-            <p:ph sz="quarter" idx="13"/>
-          </p:nvPr>
-        </p:nvSpPr>
-        <p:spPr>
-          <a:xfrm>
-            <a:off x="365760" y="1600200"/>
-            <a:ext cx="4041648" cy="4526280"/>
-          </a:xfrm>
-        </p:spPr>
-        <p:txBody>
-          <a:bodyPr/>
-          <a:lstStyle/>
-          <a:p>
-            <a:pPr lvl="0"/>
-            <a:r>
-              <a:rPr lang="en-US" smtClean="0"/>
-              <a:t>Click to edit Master text styles</a:t>
-            </a:r>
-          </a:p>
-          <a:p>
-            <a:pPr lvl="1"/>
-            <a:r>
-              <a:rPr lang="en-US" smtClean="0"/>
-              <a:t>Second level</a:t>
-            </a:r>
-          </a:p>
-          <a:p>
-            <a:pPr lvl="2"/>
-            <a:r>
-              <a:rPr lang="en-US" smtClean="0"/>
-              <a:t>Third level</a:t>
-            </a:r>
-          </a:p>
-          <a:p>
-            <a:pPr lvl="3"/>
-            <a:r>
-              <a:rPr lang="en-US" smtClean="0"/>
-              <a:t>Fourth level</a:t>
-            </a:r>
-          </a:p>
-          <a:p>
-            <a:pPr lvl="4"/>
-            <a:r>
-              <a:rPr lang="en-US" smtClean="0"/>
-              <a:t>Fifth level</a:t>
-            </a:r>
-            <a:endParaRPr lang="en-US"/>
-          </a:p>
-        </p:txBody>
-      </p:sp>
     </p:spTree>
+    <p:extLst>
+      <p:ext uri="{BB962C8B-B14F-4D97-AF65-F5344CB8AC3E}">
+        <p14:creationId xmlns:p14="http://schemas.microsoft.com/office/powerpoint/2010/main" val="99971695"/>
+      </p:ext>
+    </p:extLst>
   </p:cSld>
   <p:clrMapOvr>
     <a:masterClrMapping/>
@@ -3197,18 +3711,16 @@
         </p:nvSpPr>
         <p:spPr>
           <a:xfrm>
-            <a:off x="457200" y="1600200"/>
-            <a:ext cx="4040188" cy="609600"/>
+            <a:off x="457200" y="1535113"/>
+            <a:ext cx="4040188" cy="639762"/>
           </a:xfrm>
         </p:spPr>
         <p:txBody>
-          <a:bodyPr anchor="b">
-            <a:noAutofit/>
-          </a:bodyPr>
+          <a:bodyPr anchor="b"/>
           <a:lstStyle>
-            <a:lvl1pPr marL="0" indent="0" algn="ctr">
+            <a:lvl1pPr marL="0" indent="0">
               <a:buNone/>
-              <a:defRPr sz="2400" b="0"/>
+              <a:defRPr sz="2400" b="1"/>
             </a:lvl1pPr>
             <a:lvl2pPr marL="457200" indent="0">
               <a:buNone/>
@@ -3254,6 +3766,91 @@
       </p:sp>
       <p:sp>
         <p:nvSpPr>
+          <p:cNvPr id="4" name="Content Placeholder 3"/>
+          <p:cNvSpPr>
+            <a:spLocks noGrp="1"/>
+          </p:cNvSpPr>
+          <p:nvPr>
+            <p:ph sz="half" idx="2"/>
+          </p:nvPr>
+        </p:nvSpPr>
+        <p:spPr>
+          <a:xfrm>
+            <a:off x="457200" y="2174875"/>
+            <a:ext cx="4040188" cy="3951288"/>
+          </a:xfrm>
+        </p:spPr>
+        <p:txBody>
+          <a:bodyPr/>
+          <a:lstStyle>
+            <a:lvl1pPr>
+              <a:defRPr sz="2400"/>
+            </a:lvl1pPr>
+            <a:lvl2pPr>
+              <a:defRPr sz="2000"/>
+            </a:lvl2pPr>
+            <a:lvl3pPr>
+              <a:defRPr sz="1800"/>
+            </a:lvl3pPr>
+            <a:lvl4pPr>
+              <a:defRPr sz="1600"/>
+            </a:lvl4pPr>
+            <a:lvl5pPr>
+              <a:defRPr sz="1600"/>
+            </a:lvl5pPr>
+            <a:lvl6pPr>
+              <a:defRPr sz="1600"/>
+            </a:lvl6pPr>
+            <a:lvl7pPr>
+              <a:defRPr sz="1600"/>
+            </a:lvl7pPr>
+            <a:lvl8pPr>
+              <a:defRPr sz="1600"/>
+            </a:lvl8pPr>
+            <a:lvl9pPr>
+              <a:defRPr sz="1600"/>
+            </a:lvl9pPr>
+          </a:lstStyle>
+          <a:p>
+            <a:pPr lvl="0"/>
+            <a:r>
+              <a:rPr lang="en-US" smtClean="0"/>
+              <a:t>Click to edit Master text styles</a:t>
+            </a:r>
+          </a:p>
+          <a:p>
+            <a:pPr lvl="1"/>
+            <a:r>
+              <a:rPr lang="en-US" smtClean="0"/>
+              <a:t>Second level</a:t>
+            </a:r>
+          </a:p>
+          <a:p>
+            <a:pPr lvl="2"/>
+            <a:r>
+              <a:rPr lang="en-US" smtClean="0"/>
+              <a:t>Third level</a:t>
+            </a:r>
+          </a:p>
+          <a:p>
+            <a:pPr lvl="3"/>
+            <a:r>
+              <a:rPr lang="en-US" smtClean="0"/>
+              <a:t>Fourth level</a:t>
+            </a:r>
+          </a:p>
+          <a:p>
+            <a:pPr lvl="4"/>
+            <a:r>
+              <a:rPr lang="en-US" smtClean="0"/>
+              <a:t>Fifth level</a:t>
+            </a:r>
+            <a:endParaRPr lang="en-US"/>
+          </a:p>
+        </p:txBody>
+      </p:sp>
+      <p:sp>
+        <p:nvSpPr>
           <p:cNvPr id="5" name="Text Placeholder 4"/>
           <p:cNvSpPr>
             <a:spLocks noGrp="1"/>
@@ -3264,18 +3861,16 @@
         </p:nvSpPr>
         <p:spPr>
           <a:xfrm>
-            <a:off x="4648200" y="1600200"/>
-            <a:ext cx="4041775" cy="609600"/>
+            <a:off x="4645025" y="1535113"/>
+            <a:ext cx="4041775" cy="639762"/>
           </a:xfrm>
         </p:spPr>
         <p:txBody>
-          <a:bodyPr anchor="b">
-            <a:noAutofit/>
-          </a:bodyPr>
+          <a:bodyPr anchor="b"/>
           <a:lstStyle>
-            <a:lvl1pPr marL="0" indent="0" algn="ctr">
+            <a:lvl1pPr marL="0" indent="0">
               <a:buNone/>
-              <a:defRPr sz="2400" b="0"/>
+              <a:defRPr sz="2400" b="1"/>
             </a:lvl1pPr>
             <a:lvl2pPr marL="457200" indent="0">
               <a:buNone/>
@@ -3321,6 +3916,91 @@
       </p:sp>
       <p:sp>
         <p:nvSpPr>
+          <p:cNvPr id="6" name="Content Placeholder 5"/>
+          <p:cNvSpPr>
+            <a:spLocks noGrp="1"/>
+          </p:cNvSpPr>
+          <p:nvPr>
+            <p:ph sz="quarter" idx="4"/>
+          </p:nvPr>
+        </p:nvSpPr>
+        <p:spPr>
+          <a:xfrm>
+            <a:off x="4645025" y="2174875"/>
+            <a:ext cx="4041775" cy="3951288"/>
+          </a:xfrm>
+        </p:spPr>
+        <p:txBody>
+          <a:bodyPr/>
+          <a:lstStyle>
+            <a:lvl1pPr>
+              <a:defRPr sz="2400"/>
+            </a:lvl1pPr>
+            <a:lvl2pPr>
+              <a:defRPr sz="2000"/>
+            </a:lvl2pPr>
+            <a:lvl3pPr>
+              <a:defRPr sz="1800"/>
+            </a:lvl3pPr>
+            <a:lvl4pPr>
+              <a:defRPr sz="1600"/>
+            </a:lvl4pPr>
+            <a:lvl5pPr>
+              <a:defRPr sz="1600"/>
+            </a:lvl5pPr>
+            <a:lvl6pPr>
+              <a:defRPr sz="1600"/>
+            </a:lvl6pPr>
+            <a:lvl7pPr>
+              <a:defRPr sz="1600"/>
+            </a:lvl7pPr>
+            <a:lvl8pPr>
+              <a:defRPr sz="1600"/>
+            </a:lvl8pPr>
+            <a:lvl9pPr>
+              <a:defRPr sz="1600"/>
+            </a:lvl9pPr>
+          </a:lstStyle>
+          <a:p>
+            <a:pPr lvl="0"/>
+            <a:r>
+              <a:rPr lang="en-US" smtClean="0"/>
+              <a:t>Click to edit Master text styles</a:t>
+            </a:r>
+          </a:p>
+          <a:p>
+            <a:pPr lvl="1"/>
+            <a:r>
+              <a:rPr lang="en-US" smtClean="0"/>
+              <a:t>Second level</a:t>
+            </a:r>
+          </a:p>
+          <a:p>
+            <a:pPr lvl="2"/>
+            <a:r>
+              <a:rPr lang="en-US" smtClean="0"/>
+              <a:t>Third level</a:t>
+            </a:r>
+          </a:p>
+          <a:p>
+            <a:pPr lvl="3"/>
+            <a:r>
+              <a:rPr lang="en-US" smtClean="0"/>
+              <a:t>Fourth level</a:t>
+            </a:r>
+          </a:p>
+          <a:p>
+            <a:pPr lvl="4"/>
+            <a:r>
+              <a:rPr lang="en-US" smtClean="0"/>
+              <a:t>Fifth level</a:t>
+            </a:r>
+            <a:endParaRPr lang="en-US"/>
+          </a:p>
+        </p:txBody>
+      </p:sp>
+      <p:sp>
+        <p:nvSpPr>
           <p:cNvPr id="7" name="Date Placeholder 6"/>
           <p:cNvSpPr>
             <a:spLocks noGrp="1"/>
@@ -3336,7 +4016,7 @@
           <a:p>
             <a:fld id="{F7EAEB24-CE78-465C-A726-91D0868FA48F}" type="datetime1">
               <a:rPr lang="en-US" smtClean="0"/>
-              <a:t>8/19/14</a:t>
+              <a:t>10/18/14</a:t>
             </a:fld>
             <a:endParaRPr lang="en-US"/>
           </a:p>
@@ -3389,121 +4069,12 @@
           </a:p>
         </p:txBody>
       </p:sp>
-      <p:sp>
-        <p:nvSpPr>
-          <p:cNvPr id="11" name="Content Placeholder 10"/>
-          <p:cNvSpPr>
-            <a:spLocks noGrp="1"/>
-          </p:cNvSpPr>
-          <p:nvPr>
-            <p:ph sz="quarter" idx="13"/>
-          </p:nvPr>
-        </p:nvSpPr>
-        <p:spPr>
-          <a:xfrm>
-            <a:off x="457200" y="2212848"/>
-            <a:ext cx="4041648" cy="3913632"/>
-          </a:xfrm>
-        </p:spPr>
-        <p:txBody>
-          <a:bodyPr/>
-          <a:lstStyle/>
-          <a:p>
-            <a:pPr lvl="0"/>
-            <a:r>
-              <a:rPr lang="en-US" smtClean="0"/>
-              <a:t>Click to edit Master text styles</a:t>
-            </a:r>
-          </a:p>
-          <a:p>
-            <a:pPr lvl="1"/>
-            <a:r>
-              <a:rPr lang="en-US" smtClean="0"/>
-              <a:t>Second level</a:t>
-            </a:r>
-          </a:p>
-          <a:p>
-            <a:pPr lvl="2"/>
-            <a:r>
-              <a:rPr lang="en-US" smtClean="0"/>
-              <a:t>Third level</a:t>
-            </a:r>
-          </a:p>
-          <a:p>
-            <a:pPr lvl="3"/>
-            <a:r>
-              <a:rPr lang="en-US" smtClean="0"/>
-              <a:t>Fourth level</a:t>
-            </a:r>
-          </a:p>
-          <a:p>
-            <a:pPr lvl="4"/>
-            <a:r>
-              <a:rPr lang="en-US" smtClean="0"/>
-              <a:t>Fifth level</a:t>
-            </a:r>
-            <a:endParaRPr lang="en-US" dirty="0"/>
-          </a:p>
-        </p:txBody>
-      </p:sp>
-      <p:sp>
-        <p:nvSpPr>
-          <p:cNvPr id="13" name="Content Placeholder 12"/>
-          <p:cNvSpPr>
-            <a:spLocks noGrp="1"/>
-          </p:cNvSpPr>
-          <p:nvPr>
-            <p:ph sz="quarter" idx="14"/>
-          </p:nvPr>
-        </p:nvSpPr>
-        <p:spPr>
-          <a:xfrm>
-            <a:off x="4672584" y="2212848"/>
-            <a:ext cx="4041648" cy="3913187"/>
-          </a:xfrm>
-        </p:spPr>
-        <p:txBody>
-          <a:bodyPr/>
-          <a:lstStyle/>
-          <a:p>
-            <a:pPr lvl="0"/>
-            <a:r>
-              <a:rPr lang="en-US" smtClean="0"/>
-              <a:t>Click to edit Master text styles</a:t>
-            </a:r>
-          </a:p>
-          <a:p>
-            <a:pPr lvl="1"/>
-            <a:r>
-              <a:rPr lang="en-US" smtClean="0"/>
-              <a:t>Second level</a:t>
-            </a:r>
-          </a:p>
-          <a:p>
-            <a:pPr lvl="2"/>
-            <a:r>
-              <a:rPr lang="en-US" smtClean="0"/>
-              <a:t>Third level</a:t>
-            </a:r>
-          </a:p>
-          <a:p>
-            <a:pPr lvl="3"/>
-            <a:r>
-              <a:rPr lang="en-US" smtClean="0"/>
-              <a:t>Fourth level</a:t>
-            </a:r>
-          </a:p>
-          <a:p>
-            <a:pPr lvl="4"/>
-            <a:r>
-              <a:rPr lang="en-US" smtClean="0"/>
-              <a:t>Fifth level</a:t>
-            </a:r>
-            <a:endParaRPr lang="en-US" dirty="0"/>
-          </a:p>
-        </p:txBody>
-      </p:sp>
     </p:spTree>
+    <p:extLst>
+      <p:ext uri="{BB962C8B-B14F-4D97-AF65-F5344CB8AC3E}">
+        <p14:creationId xmlns:p14="http://schemas.microsoft.com/office/powerpoint/2010/main" val="689554887"/>
+      </p:ext>
+    </p:extLst>
   </p:cSld>
   <p:clrMapOvr>
     <a:masterClrMapping/>
@@ -3547,7 +4118,7 @@
               <a:rPr lang="en-US" smtClean="0"/>
               <a:t>Click to edit Master title style</a:t>
             </a:r>
-            <a:endParaRPr lang="en-US" dirty="0"/>
+            <a:endParaRPr lang="en-US"/>
           </a:p>
         </p:txBody>
       </p:sp>
@@ -3568,7 +4139,7 @@
           <a:p>
             <a:fld id="{40BAADF0-1749-4E8B-9691-B44A5F8C0895}" type="datetime1">
               <a:rPr lang="en-US" smtClean="0"/>
-              <a:t>8/19/14</a:t>
+              <a:t>10/18/14</a:t>
             </a:fld>
             <a:endParaRPr lang="en-US"/>
           </a:p>
@@ -3622,6 +4193,11 @@
         </p:txBody>
       </p:sp>
     </p:spTree>
+    <p:extLst>
+      <p:ext uri="{BB962C8B-B14F-4D97-AF65-F5344CB8AC3E}">
+        <p14:creationId xmlns:p14="http://schemas.microsoft.com/office/powerpoint/2010/main" val="2749660239"/>
+      </p:ext>
+    </p:extLst>
   </p:cSld>
   <p:clrMapOvr>
     <a:masterClrMapping/>
@@ -3663,7 +4239,7 @@
           <a:p>
             <a:fld id="{A8AF628A-A867-4937-BBE5-207DB6F9C51A}" type="datetime1">
               <a:rPr lang="en-US" smtClean="0"/>
-              <a:t>8/19/14</a:t>
+              <a:t>10/18/14</a:t>
             </a:fld>
             <a:endParaRPr lang="en-US"/>
           </a:p>
@@ -3717,6 +4293,11 @@
         </p:txBody>
       </p:sp>
     </p:spTree>
+    <p:extLst>
+      <p:ext uri="{BB962C8B-B14F-4D97-AF65-F5344CB8AC3E}">
+        <p14:creationId xmlns:p14="http://schemas.microsoft.com/office/powerpoint/2010/main" val="3502099666"/>
+      </p:ext>
+    </p:extLst>
   </p:cSld>
   <p:clrMapOvr>
     <a:masterClrMapping/>
@@ -3753,26 +4334,15 @@
         </p:nvSpPr>
         <p:spPr>
           <a:xfrm>
-            <a:off x="5907087" y="266700"/>
-            <a:ext cx="3008313" cy="2095500"/>
+            <a:off x="457200" y="273050"/>
+            <a:ext cx="3008313" cy="1162050"/>
           </a:xfrm>
         </p:spPr>
         <p:txBody>
           <a:bodyPr anchor="b"/>
           <a:lstStyle>
-            <a:lvl1pPr algn="ctr">
-              <a:lnSpc>
-                <a:spcPct val="100000"/>
-              </a:lnSpc>
-              <a:defRPr sz="2800" b="0">
-                <a:effectLst>
-                  <a:outerShdw blurRad="50800" dist="25400" dir="5400000" algn="t" rotWithShape="0">
-                    <a:prstClr val="black">
-                      <a:alpha val="25000"/>
-                    </a:prstClr>
-                  </a:outerShdw>
-                </a:effectLst>
-              </a:defRPr>
+            <a:lvl1pPr algn="l">
+              <a:defRPr sz="2000" b="1"/>
             </a:lvl1pPr>
           </a:lstStyle>
           <a:p>
@@ -3780,7 +4350,7 @@
               <a:rPr lang="en-US" smtClean="0"/>
               <a:t>Click to edit Master title style</a:t>
             </a:r>
-            <a:endParaRPr lang="en-US" dirty="0"/>
+            <a:endParaRPr lang="en-US"/>
           </a:p>
         </p:txBody>
       </p:sp>
@@ -3796,8 +4366,8 @@
         </p:nvSpPr>
         <p:spPr>
           <a:xfrm>
-            <a:off x="719137" y="273050"/>
-            <a:ext cx="4995863" cy="5853113"/>
+            <a:off x="3575050" y="273050"/>
+            <a:ext cx="5111750" cy="5853113"/>
           </a:xfrm>
         </p:spPr>
         <p:txBody>
@@ -3865,7 +4435,7 @@
               <a:rPr lang="en-US" smtClean="0"/>
               <a:t>Fifth level</a:t>
             </a:r>
-            <a:endParaRPr lang="en-US" dirty="0"/>
+            <a:endParaRPr lang="en-US"/>
           </a:p>
         </p:txBody>
       </p:sp>
@@ -3881,21 +4451,16 @@
         </p:nvSpPr>
         <p:spPr>
           <a:xfrm>
-            <a:off x="5907087" y="2438400"/>
-            <a:ext cx="3008313" cy="3687763"/>
+            <a:off x="457200" y="1435100"/>
+            <a:ext cx="3008313" cy="4691063"/>
           </a:xfrm>
         </p:spPr>
         <p:txBody>
-          <a:bodyPr>
-            <a:normAutofit/>
-          </a:bodyPr>
+          <a:bodyPr/>
           <a:lstStyle>
-            <a:lvl1pPr marL="0" indent="0" algn="ctr">
-              <a:lnSpc>
-                <a:spcPct val="125000"/>
-              </a:lnSpc>
+            <a:lvl1pPr marL="0" indent="0">
               <a:buNone/>
-              <a:defRPr sz="1600"/>
+              <a:defRPr sz="1400"/>
             </a:lvl1pPr>
             <a:lvl2pPr marL="457200" indent="0">
               <a:buNone/>
@@ -3956,7 +4521,7 @@
           <a:p>
             <a:fld id="{118BBB94-68E6-4675-A946-F1C5994EDBD7}" type="datetime1">
               <a:rPr lang="en-US" smtClean="0"/>
-              <a:t>8/19/14</a:t>
+              <a:t>10/18/14</a:t>
             </a:fld>
             <a:endParaRPr lang="en-US"/>
           </a:p>
@@ -4010,6 +4575,11 @@
         </p:txBody>
       </p:sp>
     </p:spTree>
+    <p:extLst>
+      <p:ext uri="{BB962C8B-B14F-4D97-AF65-F5344CB8AC3E}">
+        <p14:creationId xmlns:p14="http://schemas.microsoft.com/office/powerpoint/2010/main" val="617495610"/>
+      </p:ext>
+    </p:extLst>
   </p:cSld>
   <p:clrMapOvr>
     <a:masterClrMapping/>
@@ -4046,18 +4616,15 @@
         </p:nvSpPr>
         <p:spPr>
           <a:xfrm>
-            <a:off x="1679576" y="228600"/>
-            <a:ext cx="5711824" cy="895350"/>
+            <a:off x="1792288" y="4800600"/>
+            <a:ext cx="5486400" cy="566738"/>
           </a:xfrm>
         </p:spPr>
         <p:txBody>
           <a:bodyPr anchor="b"/>
           <a:lstStyle>
-            <a:lvl1pPr algn="ctr">
-              <a:lnSpc>
-                <a:spcPct val="100000"/>
-              </a:lnSpc>
-              <a:defRPr sz="2800" b="0"/>
+            <a:lvl1pPr algn="l">
+              <a:defRPr sz="2000" b="1"/>
             </a:lvl1pPr>
           </a:lstStyle>
           <a:p>
@@ -4065,7 +4632,7 @@
               <a:rPr lang="en-US" smtClean="0"/>
               <a:t>Click to edit Master title style</a:t>
             </a:r>
-            <a:endParaRPr lang="en-US" dirty="0"/>
+            <a:endParaRPr lang="en-US"/>
           </a:p>
         </p:txBody>
       </p:sp>
@@ -4081,26 +4648,14 @@
         </p:nvSpPr>
         <p:spPr>
           <a:xfrm>
-            <a:off x="1508126" y="1143000"/>
-            <a:ext cx="6054724" cy="4541044"/>
+            <a:off x="1792288" y="612775"/>
+            <a:ext cx="5486400" cy="4114800"/>
           </a:xfrm>
-          <a:ln w="76200">
-            <a:solidFill>
-              <a:schemeClr val="bg1"/>
-            </a:solidFill>
-          </a:ln>
-          <a:effectLst>
-            <a:outerShdw blurRad="88900" dist="50800" dir="5400000" algn="ctr" rotWithShape="0">
-              <a:srgbClr val="000000">
-                <a:alpha val="25000"/>
-              </a:srgbClr>
-            </a:outerShdw>
-          </a:effectLst>
         </p:spPr>
         <p:txBody>
-          <a:bodyPr anchor="t"/>
+          <a:bodyPr/>
           <a:lstStyle>
-            <a:lvl1pPr marL="0" indent="0" algn="ctr">
+            <a:lvl1pPr marL="0" indent="0">
               <a:buNone/>
               <a:defRPr sz="3200"/>
             </a:lvl1pPr>
@@ -4138,11 +4693,7 @@
             </a:lvl9pPr>
           </a:lstStyle>
           <a:p>
-            <a:r>
-              <a:rPr lang="en-US" smtClean="0"/>
-              <a:t>Drag picture to placeholder or click icon to add</a:t>
-            </a:r>
-            <a:endParaRPr lang="en-US" dirty="0"/>
+            <a:endParaRPr lang="en-US"/>
           </a:p>
         </p:txBody>
       </p:sp>
@@ -4158,18 +4709,16 @@
         </p:nvSpPr>
         <p:spPr>
           <a:xfrm>
-            <a:off x="1679576" y="5810250"/>
-            <a:ext cx="5711824" cy="533400"/>
+            <a:off x="1792288" y="5367338"/>
+            <a:ext cx="5486400" cy="804862"/>
           </a:xfrm>
         </p:spPr>
         <p:txBody>
-          <a:bodyPr>
-            <a:normAutofit/>
-          </a:bodyPr>
+          <a:bodyPr/>
           <a:lstStyle>
-            <a:lvl1pPr marL="0" indent="0" algn="ctr">
+            <a:lvl1pPr marL="0" indent="0">
               <a:buNone/>
-              <a:defRPr sz="1600"/>
+              <a:defRPr sz="1400"/>
             </a:lvl1pPr>
             <a:lvl2pPr marL="457200" indent="0">
               <a:buNone/>
@@ -4230,7 +4779,7 @@
           <a:p>
             <a:fld id="{DC3B8377-21E3-4835-B75D-4E2847E2750F}" type="datetime1">
               <a:rPr lang="en-US" smtClean="0"/>
-              <a:t>8/19/14</a:t>
+              <a:t>10/18/14</a:t>
             </a:fld>
             <a:endParaRPr lang="en-US"/>
           </a:p>
@@ -4284,6 +4833,11 @@
         </p:txBody>
       </p:sp>
     </p:spTree>
+    <p:extLst>
+      <p:ext uri="{BB962C8B-B14F-4D97-AF65-F5344CB8AC3E}">
+        <p14:creationId xmlns:p14="http://schemas.microsoft.com/office/powerpoint/2010/main" val="1028443109"/>
+      </p:ext>
+    </p:extLst>
   </p:cSld>
   <p:clrMapOvr>
     <a:masterClrMapping/>
@@ -4295,7 +4849,7 @@
 <p:sldMaster xmlns:a="http://schemas.openxmlformats.org/drawingml/2006/main" xmlns:r="http://schemas.openxmlformats.org/officeDocument/2006/relationships" xmlns:p="http://schemas.openxmlformats.org/presentationml/2006/main">
   <p:cSld>
     <p:bg>
-      <p:bgRef idx="1002">
+      <p:bgRef idx="1001">
         <a:schemeClr val="bg1"/>
       </p:bgRef>
     </p:bg>
@@ -4325,16 +4879,16 @@
         </p:nvSpPr>
         <p:spPr>
           <a:xfrm>
-            <a:off x="457200" y="0"/>
-            <a:ext cx="8229600" cy="1600200"/>
+            <a:off x="457200" y="274638"/>
+            <a:ext cx="8229600" cy="1143000"/>
           </a:xfrm>
           <a:prstGeom prst="rect">
             <a:avLst/>
           </a:prstGeom>
         </p:spPr>
         <p:txBody>
-          <a:bodyPr vert="horz" lIns="91440" tIns="45720" rIns="91440" bIns="45720" rtlCol="0" anchor="b">
-            <a:noAutofit/>
+          <a:bodyPr vert="horz" lIns="91440" tIns="45720" rIns="91440" bIns="45720" rtlCol="0" anchor="ctr">
+            <a:normAutofit/>
           </a:bodyPr>
           <a:lstStyle/>
           <a:p>
@@ -4342,7 +4896,7 @@
               <a:rPr lang="en-US" smtClean="0"/>
               <a:t>Click to edit Master title style</a:t>
             </a:r>
-            <a:endParaRPr lang="en-US" dirty="0"/>
+            <a:endParaRPr lang="en-US"/>
           </a:p>
         </p:txBody>
       </p:sp>
@@ -4404,7 +4958,7 @@
               <a:rPr lang="en-US" smtClean="0"/>
               <a:t>Fifth level</a:t>
             </a:r>
-            <a:endParaRPr lang="en-US" dirty="0" smtClean="0"/>
+            <a:endParaRPr lang="en-US"/>
           </a:p>
         </p:txBody>
       </p:sp>
@@ -4420,32 +4974,30 @@
         </p:nvSpPr>
         <p:spPr>
           <a:xfrm>
-            <a:off x="6363347" y="6356350"/>
-            <a:ext cx="2085975" cy="365125"/>
+            <a:off x="457200" y="6356350"/>
+            <a:ext cx="2133600" cy="365125"/>
           </a:xfrm>
           <a:prstGeom prst="rect">
             <a:avLst/>
           </a:prstGeom>
         </p:spPr>
         <p:txBody>
-          <a:bodyPr vert="horz" lIns="91440" tIns="45720" rIns="45720" bIns="45720" rtlCol="0" anchor="ctr"/>
+          <a:bodyPr vert="horz" lIns="91440" tIns="45720" rIns="91440" bIns="45720" rtlCol="0" anchor="ctr"/>
           <a:lstStyle>
-            <a:lvl1pPr algn="r">
+            <a:lvl1pPr algn="l">
               <a:defRPr sz="1200">
                 <a:solidFill>
                   <a:schemeClr val="tx1">
-                    <a:lumMod val="65000"/>
-                    <a:lumOff val="35000"/>
+                    <a:tint val="75000"/>
                   </a:schemeClr>
                 </a:solidFill>
-                <a:latin typeface="Century Gothic" pitchFamily="34" charset="0"/>
               </a:defRPr>
             </a:lvl1pPr>
           </a:lstStyle>
           <a:p>
             <a:fld id="{B0C4986D-6BE9-4264-908F-02DB36FD8D6C}" type="datetime1">
               <a:rPr lang="en-US" smtClean="0"/>
-              <a:t>8/19/14</a:t>
+              <a:t>10/18/14</a:t>
             </a:fld>
             <a:endParaRPr lang="en-US" dirty="0"/>
           </a:p>
@@ -4463,25 +5015,23 @@
         </p:nvSpPr>
         <p:spPr>
           <a:xfrm>
-            <a:off x="659165" y="6356350"/>
-            <a:ext cx="2847975" cy="365125"/>
+            <a:off x="3124200" y="6356350"/>
+            <a:ext cx="2895600" cy="365125"/>
           </a:xfrm>
           <a:prstGeom prst="rect">
             <a:avLst/>
           </a:prstGeom>
         </p:spPr>
         <p:txBody>
-          <a:bodyPr vert="horz" lIns="45720" tIns="45720" rIns="91440" bIns="45720" rtlCol="0" anchor="ctr"/>
+          <a:bodyPr vert="horz" lIns="91440" tIns="45720" rIns="91440" bIns="45720" rtlCol="0" anchor="ctr"/>
           <a:lstStyle>
-            <a:lvl1pPr algn="l">
+            <a:lvl1pPr algn="ctr">
               <a:defRPr sz="1200">
                 <a:solidFill>
                   <a:schemeClr val="tx1">
-                    <a:lumMod val="65000"/>
-                    <a:lumOff val="35000"/>
+                    <a:tint val="75000"/>
                   </a:schemeClr>
                 </a:solidFill>
-                <a:latin typeface="Century Gothic" pitchFamily="34" charset="0"/>
               </a:defRPr>
             </a:lvl1pPr>
           </a:lstStyle>
@@ -4506,25 +5056,23 @@
         </p:nvSpPr>
         <p:spPr>
           <a:xfrm>
-            <a:off x="8543278" y="6356350"/>
-            <a:ext cx="561975" cy="365125"/>
+            <a:off x="6553200" y="6356350"/>
+            <a:ext cx="2133600" cy="365125"/>
           </a:xfrm>
           <a:prstGeom prst="rect">
             <a:avLst/>
           </a:prstGeom>
         </p:spPr>
         <p:txBody>
-          <a:bodyPr vert="horz" lIns="27432" tIns="45720" rIns="45720" bIns="45720" rtlCol="0" anchor="ctr"/>
+          <a:bodyPr vert="horz" lIns="91440" tIns="45720" rIns="91440" bIns="45720" rtlCol="0" anchor="ctr"/>
           <a:lstStyle>
-            <a:lvl1pPr algn="l">
+            <a:lvl1pPr algn="r">
               <a:defRPr sz="1200">
                 <a:solidFill>
                   <a:schemeClr val="tx1">
-                    <a:lumMod val="65000"/>
-                    <a:lumOff val="35000"/>
+                    <a:tint val="75000"/>
                   </a:schemeClr>
                 </a:solidFill>
-                <a:latin typeface="Century Gothic" pitchFamily="34" charset="0"/>
               </a:defRPr>
             </a:lvl1pPr>
           </a:lstStyle>
@@ -4538,316 +5086,177 @@
           </a:p>
         </p:txBody>
       </p:sp>
-      <p:sp>
-        <p:nvSpPr>
-          <p:cNvPr id="7" name="Oval 6"/>
-          <p:cNvSpPr/>
-          <p:nvPr/>
-        </p:nvSpPr>
-        <p:spPr>
-          <a:xfrm>
-            <a:off x="8457760" y="6499384"/>
-            <a:ext cx="84772" cy="84772"/>
-          </a:xfrm>
-          <a:prstGeom prst="ellipse">
-            <a:avLst/>
-          </a:prstGeom>
-          <a:solidFill>
-            <a:schemeClr val="tx1">
-              <a:lumMod val="50000"/>
-              <a:lumOff val="50000"/>
-            </a:schemeClr>
-          </a:solidFill>
-          <a:ln w="12700">
-            <a:noFill/>
-          </a:ln>
-          <a:effectLst/>
-        </p:spPr>
-        <p:style>
-          <a:lnRef idx="2">
-            <a:schemeClr val="accent1">
-              <a:shade val="50000"/>
-            </a:schemeClr>
-          </a:lnRef>
-          <a:fillRef idx="1">
-            <a:schemeClr val="accent1"/>
-          </a:fillRef>
-          <a:effectRef idx="0">
-            <a:schemeClr val="accent1"/>
-          </a:effectRef>
-          <a:fontRef idx="minor">
-            <a:schemeClr val="lt1"/>
-          </a:fontRef>
-        </p:style>
-        <p:txBody>
-          <a:bodyPr rtlCol="0" anchor="ctr"/>
-          <a:lstStyle/>
-          <a:p>
-            <a:pPr marL="0" algn="ctr" defTabSz="914400" rtl="0" eaLnBrk="1" latinLnBrk="0" hangingPunct="1"/>
-            <a:endParaRPr lang="en-US" sz="1800" kern="1200">
-              <a:solidFill>
-                <a:schemeClr val="lt1"/>
-              </a:solidFill>
-              <a:latin typeface="+mn-lt"/>
-              <a:ea typeface="+mn-ea"/>
-              <a:cs typeface="+mn-cs"/>
-            </a:endParaRPr>
-          </a:p>
-        </p:txBody>
-      </p:sp>
-      <p:sp>
-        <p:nvSpPr>
-          <p:cNvPr id="8" name="Oval 7"/>
-          <p:cNvSpPr/>
-          <p:nvPr/>
-        </p:nvSpPr>
-        <p:spPr>
-          <a:xfrm>
-            <a:off x="569119" y="6499384"/>
-            <a:ext cx="84772" cy="84772"/>
-          </a:xfrm>
-          <a:prstGeom prst="ellipse">
-            <a:avLst/>
-          </a:prstGeom>
-          <a:solidFill>
-            <a:schemeClr val="tx1">
-              <a:lumMod val="50000"/>
-              <a:lumOff val="50000"/>
-            </a:schemeClr>
-          </a:solidFill>
-          <a:ln w="12700">
-            <a:noFill/>
-          </a:ln>
-          <a:effectLst/>
-        </p:spPr>
-        <p:style>
-          <a:lnRef idx="2">
-            <a:schemeClr val="accent1">
-              <a:shade val="50000"/>
-            </a:schemeClr>
-          </a:lnRef>
-          <a:fillRef idx="1">
-            <a:schemeClr val="accent1"/>
-          </a:fillRef>
-          <a:effectRef idx="0">
-            <a:schemeClr val="accent1"/>
-          </a:effectRef>
-          <a:fontRef idx="minor">
-            <a:schemeClr val="lt1"/>
-          </a:fontRef>
-        </p:style>
-        <p:txBody>
-          <a:bodyPr rtlCol="0" anchor="ctr"/>
-          <a:lstStyle/>
-          <a:p>
-            <a:pPr algn="ctr"/>
-            <a:endParaRPr lang="en-US"/>
-          </a:p>
-        </p:txBody>
-      </p:sp>
     </p:spTree>
+    <p:extLst>
+      <p:ext uri="{BB962C8B-B14F-4D97-AF65-F5344CB8AC3E}">
+        <p14:creationId xmlns:p14="http://schemas.microsoft.com/office/powerpoint/2010/main" val="2154093298"/>
+      </p:ext>
+    </p:extLst>
   </p:cSld>
   <p:clrMap bg1="lt1" tx1="dk1" bg2="lt2" tx2="dk2" accent1="accent1" accent2="accent2" accent3="accent3" accent4="accent4" accent5="accent5" accent6="accent6" hlink="hlink" folHlink="folHlink"/>
   <p:sldLayoutIdLst>
-    <p:sldLayoutId id="2147483649" r:id="rId1"/>
-    <p:sldLayoutId id="2147483650" r:id="rId2"/>
-    <p:sldLayoutId id="2147483651" r:id="rId3"/>
-    <p:sldLayoutId id="2147483652" r:id="rId4"/>
-    <p:sldLayoutId id="2147483653" r:id="rId5"/>
-    <p:sldLayoutId id="2147483654" r:id="rId6"/>
-    <p:sldLayoutId id="2147483655" r:id="rId7"/>
-    <p:sldLayoutId id="2147483656" r:id="rId8"/>
-    <p:sldLayoutId id="2147483657" r:id="rId9"/>
-    <p:sldLayoutId id="2147483658" r:id="rId10"/>
-    <p:sldLayoutId id="2147483659" r:id="rId11"/>
+    <p:sldLayoutId id="2147483714" r:id="rId1"/>
+    <p:sldLayoutId id="2147483715" r:id="rId2"/>
+    <p:sldLayoutId id="2147483716" r:id="rId3"/>
+    <p:sldLayoutId id="2147483717" r:id="rId4"/>
+    <p:sldLayoutId id="2147483718" r:id="rId5"/>
+    <p:sldLayoutId id="2147483719" r:id="rId6"/>
+    <p:sldLayoutId id="2147483720" r:id="rId7"/>
+    <p:sldLayoutId id="2147483721" r:id="rId8"/>
+    <p:sldLayoutId id="2147483722" r:id="rId9"/>
+    <p:sldLayoutId id="2147483723" r:id="rId10"/>
+    <p:sldLayoutId id="2147483724" r:id="rId11"/>
   </p:sldLayoutIdLst>
   <p:hf sldNum="0" hdr="0" ftr="0" dt="0"/>
   <p:txStyles>
     <p:titleStyle>
-      <a:lvl1pPr algn="ctr" defTabSz="914400" rtl="0" eaLnBrk="1" latinLnBrk="0" hangingPunct="1">
-        <a:lnSpc>
-          <a:spcPts val="5800"/>
-        </a:lnSpc>
+      <a:lvl1pPr algn="ctr" defTabSz="457200" rtl="0" eaLnBrk="1" latinLnBrk="0" hangingPunct="1">
         <a:spcBef>
           <a:spcPct val="0"/>
         </a:spcBef>
         <a:buNone/>
-        <a:defRPr sz="5400" kern="1200">
+        <a:defRPr sz="4400" kern="1200">
           <a:solidFill>
-            <a:schemeClr val="tx2"/>
+            <a:schemeClr val="tx1"/>
           </a:solidFill>
-          <a:effectLst>
-            <a:outerShdw blurRad="63500" dist="38100" dir="5400000" algn="t" rotWithShape="0">
-              <a:prstClr val="black">
-                <a:alpha val="25000"/>
-              </a:prstClr>
-            </a:outerShdw>
-          </a:effectLst>
-          <a:latin typeface="+mn-lt"/>
+          <a:latin typeface="+mj-lt"/>
           <a:ea typeface="+mj-ea"/>
           <a:cs typeface="+mj-cs"/>
         </a:defRPr>
       </a:lvl1pPr>
     </p:titleStyle>
     <p:bodyStyle>
-      <a:lvl1pPr marL="342900" indent="-342900" algn="l" defTabSz="914400" rtl="0" eaLnBrk="1" latinLnBrk="0" hangingPunct="1">
+      <a:lvl1pPr marL="342900" indent="-342900" algn="l" defTabSz="457200" rtl="0" eaLnBrk="1" latinLnBrk="0" hangingPunct="1">
         <a:spcBef>
           <a:spcPct val="20000"/>
         </a:spcBef>
-        <a:buFont typeface="Arial" pitchFamily="34" charset="0"/>
+        <a:buFont typeface="Arial"/>
         <a:buChar char="•"/>
-        <a:defRPr sz="2400" kern="1200">
+        <a:defRPr sz="3200" kern="1200">
           <a:solidFill>
-            <a:schemeClr val="tx1">
-              <a:lumMod val="50000"/>
-              <a:lumOff val="50000"/>
-            </a:schemeClr>
+            <a:schemeClr val="tx1"/>
           </a:solidFill>
-          <a:latin typeface="+mj-lt"/>
+          <a:latin typeface="+mn-lt"/>
           <a:ea typeface="+mn-ea"/>
           <a:cs typeface="+mn-cs"/>
         </a:defRPr>
       </a:lvl1pPr>
-      <a:lvl2pPr marL="742950" indent="-285750" algn="l" defTabSz="914400" rtl="0" eaLnBrk="1" latinLnBrk="0" hangingPunct="1">
+      <a:lvl2pPr marL="742950" indent="-285750" algn="l" defTabSz="457200" rtl="0" eaLnBrk="1" latinLnBrk="0" hangingPunct="1">
         <a:spcBef>
           <a:spcPct val="20000"/>
         </a:spcBef>
-        <a:buFont typeface="Courier New" pitchFamily="49" charset="0"/>
-        <a:buChar char="o"/>
-        <a:defRPr sz="1600" kern="1200">
+        <a:buFont typeface="Arial"/>
+        <a:buChar char="–"/>
+        <a:defRPr sz="2800" kern="1200">
           <a:solidFill>
-            <a:schemeClr val="tx1">
-              <a:lumMod val="50000"/>
-              <a:lumOff val="50000"/>
-            </a:schemeClr>
+            <a:schemeClr val="tx1"/>
           </a:solidFill>
-          <a:latin typeface="+mj-lt"/>
+          <a:latin typeface="+mn-lt"/>
           <a:ea typeface="+mn-ea"/>
           <a:cs typeface="+mn-cs"/>
         </a:defRPr>
       </a:lvl2pPr>
-      <a:lvl3pPr marL="1143000" indent="-228600" algn="l" defTabSz="914400" rtl="0" eaLnBrk="1" latinLnBrk="0" hangingPunct="1">
+      <a:lvl3pPr marL="1143000" indent="-228600" algn="l" defTabSz="457200" rtl="0" eaLnBrk="1" latinLnBrk="0" hangingPunct="1">
         <a:spcBef>
           <a:spcPct val="20000"/>
         </a:spcBef>
-        <a:buFont typeface="Arial" pitchFamily="34" charset="0"/>
+        <a:buFont typeface="Arial"/>
         <a:buChar char="•"/>
-        <a:defRPr sz="1600" kern="1200">
+        <a:defRPr sz="2400" kern="1200">
           <a:solidFill>
-            <a:schemeClr val="tx1">
-              <a:lumMod val="50000"/>
-              <a:lumOff val="50000"/>
-            </a:schemeClr>
+            <a:schemeClr val="tx1"/>
           </a:solidFill>
-          <a:latin typeface="+mj-lt"/>
+          <a:latin typeface="+mn-lt"/>
           <a:ea typeface="+mn-ea"/>
           <a:cs typeface="+mn-cs"/>
         </a:defRPr>
       </a:lvl3pPr>
-      <a:lvl4pPr marL="1600200" indent="-228600" algn="l" defTabSz="914400" rtl="0" eaLnBrk="1" latinLnBrk="0" hangingPunct="1">
+      <a:lvl4pPr marL="1600200" indent="-228600" algn="l" defTabSz="457200" rtl="0" eaLnBrk="1" latinLnBrk="0" hangingPunct="1">
         <a:spcBef>
           <a:spcPct val="20000"/>
         </a:spcBef>
-        <a:buFont typeface="Courier New" pitchFamily="49" charset="0"/>
-        <a:buChar char="o"/>
-        <a:defRPr sz="1600" kern="1200">
+        <a:buFont typeface="Arial"/>
+        <a:buChar char="–"/>
+        <a:defRPr sz="2000" kern="1200">
           <a:solidFill>
-            <a:schemeClr val="tx1">
-              <a:lumMod val="50000"/>
-              <a:lumOff val="50000"/>
-            </a:schemeClr>
+            <a:schemeClr val="tx1"/>
           </a:solidFill>
-          <a:latin typeface="+mj-lt"/>
+          <a:latin typeface="+mn-lt"/>
           <a:ea typeface="+mn-ea"/>
           <a:cs typeface="+mn-cs"/>
         </a:defRPr>
       </a:lvl4pPr>
-      <a:lvl5pPr marL="2057400" indent="-228600" algn="l" defTabSz="914400" rtl="0" eaLnBrk="1" latinLnBrk="0" hangingPunct="1">
+      <a:lvl5pPr marL="2057400" indent="-228600" algn="l" defTabSz="457200" rtl="0" eaLnBrk="1" latinLnBrk="0" hangingPunct="1">
         <a:spcBef>
           <a:spcPct val="20000"/>
         </a:spcBef>
-        <a:buFont typeface="Arial" pitchFamily="34" charset="0"/>
-        <a:buChar char="•"/>
-        <a:defRPr sz="1600" kern="1200">
+        <a:buFont typeface="Arial"/>
+        <a:buChar char="»"/>
+        <a:defRPr sz="2000" kern="1200">
           <a:solidFill>
-            <a:schemeClr val="tx1">
-              <a:lumMod val="50000"/>
-              <a:lumOff val="50000"/>
-            </a:schemeClr>
+            <a:schemeClr val="tx1"/>
           </a:solidFill>
-          <a:latin typeface="+mj-lt"/>
+          <a:latin typeface="+mn-lt"/>
           <a:ea typeface="+mn-ea"/>
           <a:cs typeface="+mn-cs"/>
         </a:defRPr>
       </a:lvl5pPr>
-      <a:lvl6pPr marL="2514600" indent="-228600" algn="l" defTabSz="914400" rtl="0" eaLnBrk="1" latinLnBrk="0" hangingPunct="1">
+      <a:lvl6pPr marL="2514600" indent="-228600" algn="l" defTabSz="457200" rtl="0" eaLnBrk="1" latinLnBrk="0" hangingPunct="1">
         <a:spcBef>
           <a:spcPct val="20000"/>
         </a:spcBef>
-        <a:buFont typeface="Courier New" pitchFamily="49" charset="0"/>
-        <a:buChar char="o"/>
-        <a:defRPr sz="1600" kern="1200">
+        <a:buFont typeface="Arial"/>
+        <a:buChar char="•"/>
+        <a:defRPr sz="2000" kern="1200">
           <a:solidFill>
-            <a:schemeClr val="tx1">
-              <a:lumMod val="50000"/>
-              <a:lumOff val="50000"/>
-            </a:schemeClr>
+            <a:schemeClr val="tx1"/>
           </a:solidFill>
-          <a:latin typeface="+mj-lt"/>
+          <a:latin typeface="+mn-lt"/>
           <a:ea typeface="+mn-ea"/>
           <a:cs typeface="+mn-cs"/>
         </a:defRPr>
       </a:lvl6pPr>
-      <a:lvl7pPr marL="2971800" indent="-228600" algn="l" defTabSz="914400" rtl="0" eaLnBrk="1" latinLnBrk="0" hangingPunct="1">
+      <a:lvl7pPr marL="2971800" indent="-228600" algn="l" defTabSz="457200" rtl="0" eaLnBrk="1" latinLnBrk="0" hangingPunct="1">
         <a:spcBef>
           <a:spcPct val="20000"/>
         </a:spcBef>
-        <a:buFont typeface="Arial" pitchFamily="34" charset="0"/>
+        <a:buFont typeface="Arial"/>
         <a:buChar char="•"/>
-        <a:defRPr sz="1600" kern="1200">
+        <a:defRPr sz="2000" kern="1200">
           <a:solidFill>
-            <a:schemeClr val="tx1">
-              <a:lumMod val="50000"/>
-              <a:lumOff val="50000"/>
-            </a:schemeClr>
+            <a:schemeClr val="tx1"/>
           </a:solidFill>
-          <a:latin typeface="+mj-lt"/>
+          <a:latin typeface="+mn-lt"/>
           <a:ea typeface="+mn-ea"/>
           <a:cs typeface="+mn-cs"/>
         </a:defRPr>
       </a:lvl7pPr>
-      <a:lvl8pPr marL="3429000" indent="-228600" algn="l" defTabSz="914400" rtl="0" eaLnBrk="1" latinLnBrk="0" hangingPunct="1">
+      <a:lvl8pPr marL="3429000" indent="-228600" algn="l" defTabSz="457200" rtl="0" eaLnBrk="1" latinLnBrk="0" hangingPunct="1">
         <a:spcBef>
           <a:spcPct val="20000"/>
         </a:spcBef>
-        <a:buFont typeface="Courier New" pitchFamily="49" charset="0"/>
-        <a:buChar char="o"/>
-        <a:defRPr sz="1600" kern="1200">
+        <a:buFont typeface="Arial"/>
+        <a:buChar char="•"/>
+        <a:defRPr sz="2000" kern="1200">
           <a:solidFill>
-            <a:schemeClr val="tx1">
-              <a:lumMod val="50000"/>
-              <a:lumOff val="50000"/>
-            </a:schemeClr>
+            <a:schemeClr val="tx1"/>
           </a:solidFill>
-          <a:latin typeface="+mj-lt"/>
+          <a:latin typeface="+mn-lt"/>
           <a:ea typeface="+mn-ea"/>
           <a:cs typeface="+mn-cs"/>
         </a:defRPr>
       </a:lvl8pPr>
-      <a:lvl9pPr marL="3886200" indent="-228600" algn="l" defTabSz="914400" rtl="0" eaLnBrk="1" latinLnBrk="0" hangingPunct="1">
+      <a:lvl9pPr marL="3886200" indent="-228600" algn="l" defTabSz="457200" rtl="0" eaLnBrk="1" latinLnBrk="0" hangingPunct="1">
         <a:spcBef>
           <a:spcPct val="20000"/>
         </a:spcBef>
-        <a:buFont typeface="Arial" pitchFamily="34" charset="0"/>
+        <a:buFont typeface="Arial"/>
         <a:buChar char="•"/>
-        <a:defRPr sz="1600" kern="1200">
+        <a:defRPr sz="2000" kern="1200">
           <a:solidFill>
-            <a:schemeClr val="tx1">
-              <a:lumMod val="50000"/>
-              <a:lumOff val="50000"/>
-            </a:schemeClr>
+            <a:schemeClr val="tx1"/>
           </a:solidFill>
-          <a:latin typeface="+mj-lt"/>
+          <a:latin typeface="+mn-lt"/>
           <a:ea typeface="+mn-ea"/>
           <a:cs typeface="+mn-cs"/>
         </a:defRPr>
@@ -4857,7 +5266,7 @@
       <a:defPPr>
         <a:defRPr lang="en-US"/>
       </a:defPPr>
-      <a:lvl1pPr marL="0" algn="l" defTabSz="914400" rtl="0" eaLnBrk="1" latinLnBrk="0" hangingPunct="1">
+      <a:lvl1pPr marL="0" algn="l" defTabSz="457200" rtl="0" eaLnBrk="1" latinLnBrk="0" hangingPunct="1">
         <a:defRPr sz="1800" kern="1200">
           <a:solidFill>
             <a:schemeClr val="tx1"/>
@@ -4867,7 +5276,7 @@
           <a:cs typeface="+mn-cs"/>
         </a:defRPr>
       </a:lvl1pPr>
-      <a:lvl2pPr marL="457200" algn="l" defTabSz="914400" rtl="0" eaLnBrk="1" latinLnBrk="0" hangingPunct="1">
+      <a:lvl2pPr marL="457200" algn="l" defTabSz="457200" rtl="0" eaLnBrk="1" latinLnBrk="0" hangingPunct="1">
         <a:defRPr sz="1800" kern="1200">
           <a:solidFill>
             <a:schemeClr val="tx1"/>
@@ -4877,7 +5286,7 @@
           <a:cs typeface="+mn-cs"/>
         </a:defRPr>
       </a:lvl2pPr>
-      <a:lvl3pPr marL="914400" algn="l" defTabSz="914400" rtl="0" eaLnBrk="1" latinLnBrk="0" hangingPunct="1">
+      <a:lvl3pPr marL="914400" algn="l" defTabSz="457200" rtl="0" eaLnBrk="1" latinLnBrk="0" hangingPunct="1">
         <a:defRPr sz="1800" kern="1200">
           <a:solidFill>
             <a:schemeClr val="tx1"/>
@@ -4887,7 +5296,7 @@
           <a:cs typeface="+mn-cs"/>
         </a:defRPr>
       </a:lvl3pPr>
-      <a:lvl4pPr marL="1371600" algn="l" defTabSz="914400" rtl="0" eaLnBrk="1" latinLnBrk="0" hangingPunct="1">
+      <a:lvl4pPr marL="1371600" algn="l" defTabSz="457200" rtl="0" eaLnBrk="1" latinLnBrk="0" hangingPunct="1">
         <a:defRPr sz="1800" kern="1200">
           <a:solidFill>
             <a:schemeClr val="tx1"/>
@@ -4897,7 +5306,7 @@
           <a:cs typeface="+mn-cs"/>
         </a:defRPr>
       </a:lvl4pPr>
-      <a:lvl5pPr marL="1828800" algn="l" defTabSz="914400" rtl="0" eaLnBrk="1" latinLnBrk="0" hangingPunct="1">
+      <a:lvl5pPr marL="1828800" algn="l" defTabSz="457200" rtl="0" eaLnBrk="1" latinLnBrk="0" hangingPunct="1">
         <a:defRPr sz="1800" kern="1200">
           <a:solidFill>
             <a:schemeClr val="tx1"/>
@@ -4907,7 +5316,7 @@
           <a:cs typeface="+mn-cs"/>
         </a:defRPr>
       </a:lvl5pPr>
-      <a:lvl6pPr marL="2286000" algn="l" defTabSz="914400" rtl="0" eaLnBrk="1" latinLnBrk="0" hangingPunct="1">
+      <a:lvl6pPr marL="2286000" algn="l" defTabSz="457200" rtl="0" eaLnBrk="1" latinLnBrk="0" hangingPunct="1">
         <a:defRPr sz="1800" kern="1200">
           <a:solidFill>
             <a:schemeClr val="tx1"/>
@@ -4917,7 +5326,7 @@
           <a:cs typeface="+mn-cs"/>
         </a:defRPr>
       </a:lvl6pPr>
-      <a:lvl7pPr marL="2743200" algn="l" defTabSz="914400" rtl="0" eaLnBrk="1" latinLnBrk="0" hangingPunct="1">
+      <a:lvl7pPr marL="2743200" algn="l" defTabSz="457200" rtl="0" eaLnBrk="1" latinLnBrk="0" hangingPunct="1">
         <a:defRPr sz="1800" kern="1200">
           <a:solidFill>
             <a:schemeClr val="tx1"/>
@@ -4927,7 +5336,7 @@
           <a:cs typeface="+mn-cs"/>
         </a:defRPr>
       </a:lvl7pPr>
-      <a:lvl8pPr marL="3200400" algn="l" defTabSz="914400" rtl="0" eaLnBrk="1" latinLnBrk="0" hangingPunct="1">
+      <a:lvl8pPr marL="3200400" algn="l" defTabSz="457200" rtl="0" eaLnBrk="1" latinLnBrk="0" hangingPunct="1">
         <a:defRPr sz="1800" kern="1200">
           <a:solidFill>
             <a:schemeClr val="tx1"/>
@@ -4937,7 +5346,7 @@
           <a:cs typeface="+mn-cs"/>
         </a:defRPr>
       </a:lvl8pPr>
-      <a:lvl9pPr marL="3657600" algn="l" defTabSz="914400" rtl="0" eaLnBrk="1" latinLnBrk="0" hangingPunct="1">
+      <a:lvl9pPr marL="3657600" algn="l" defTabSz="457200" rtl="0" eaLnBrk="1" latinLnBrk="0" hangingPunct="1">
         <a:defRPr sz="1800" kern="1200">
           <a:solidFill>
             <a:schemeClr val="tx1"/>
@@ -5029,6 +5438,13 @@
   <p:clrMapOvr>
     <a:masterClrMapping/>
   </p:clrMapOvr>
+  <p:timing>
+    <p:tnLst>
+      <p:par>
+        <p:cTn xmlns:p14="http://schemas.microsoft.com/office/powerpoint/2010/main" id="1" dur="indefinite" restart="never" nodeType="tmRoot"/>
+      </p:par>
+    </p:tnLst>
+  </p:timing>
 </p:sld>
 </file>
 
@@ -6313,6 +6729,24 @@
           <a:p>
             <a:r>
               <a:rPr lang="en-US" dirty="0" smtClean="0"/>
+              <a:t>Limitation</a:t>
+            </a:r>
+          </a:p>
+          <a:p>
+            <a:pPr lvl="1"/>
+            <a:r>
+              <a:rPr lang="en-US" dirty="0" smtClean="0"/>
+              <a:t>Keys </a:t>
+            </a:r>
+            <a:r>
+              <a:rPr lang="en-US" smtClean="0"/>
+              <a:t>are strings</a:t>
+            </a:r>
+            <a:endParaRPr lang="en-US" dirty="0" smtClean="0"/>
+          </a:p>
+          <a:p>
+            <a:r>
+              <a:rPr lang="en-US" dirty="0" smtClean="0"/>
               <a:t>ECMAScript6 has native support</a:t>
             </a:r>
           </a:p>
@@ -8671,7 +9105,9 @@
           </a:solidFill>
         </p:spPr>
         <p:txBody>
-          <a:bodyPr/>
+          <a:bodyPr>
+            <a:normAutofit fontScale="77500" lnSpcReduction="20000"/>
+          </a:bodyPr>
           <a:lstStyle/>
           <a:p>
             <a:pPr marL="0" marR="0" indent="0">
@@ -9859,6 +10295,56 @@
       </p:sp>
       <p:sp>
         <p:nvSpPr>
+          <p:cNvPr id="7" name="Content Placeholder 6"/>
+          <p:cNvSpPr>
+            <a:spLocks noGrp="1"/>
+          </p:cNvSpPr>
+          <p:nvPr>
+            <p:ph idx="1"/>
+          </p:nvPr>
+        </p:nvSpPr>
+        <p:spPr>
+          <a:xfrm>
+            <a:off x="2946400" y="3230881"/>
+            <a:ext cx="822960" cy="822960"/>
+          </a:xfrm>
+          <a:prstGeom prst="ellipse">
+            <a:avLst/>
+          </a:prstGeom>
+        </p:spPr>
+        <p:style>
+          <a:lnRef idx="1">
+            <a:schemeClr val="accent2"/>
+          </a:lnRef>
+          <a:fillRef idx="3">
+            <a:schemeClr val="accent2"/>
+          </a:fillRef>
+          <a:effectRef idx="2">
+            <a:schemeClr val="accent2"/>
+          </a:effectRef>
+          <a:fontRef idx="minor">
+            <a:schemeClr val="lt1"/>
+          </a:fontRef>
+        </p:style>
+        <p:txBody>
+          <a:bodyPr rtlCol="0" anchor="ctr">
+            <a:normAutofit fontScale="92500"/>
+          </a:bodyPr>
+          <a:lstStyle/>
+          <a:p>
+            <a:pPr marL="0" indent="0" algn="ctr">
+              <a:buNone/>
+            </a:pPr>
+            <a:r>
+              <a:rPr lang="en-US" dirty="0" smtClean="0"/>
+              <a:t>80</a:t>
+            </a:r>
+            <a:endParaRPr lang="en-US" dirty="0"/>
+          </a:p>
+        </p:txBody>
+      </p:sp>
+      <p:sp>
+        <p:nvSpPr>
           <p:cNvPr id="4" name="Oval 3"/>
           <p:cNvSpPr/>
           <p:nvPr/>
@@ -9898,54 +10384,6 @@
                 </a:solidFill>
               </a:rPr>
               <a:t>10</a:t>
-            </a:r>
-            <a:endParaRPr lang="en-US" dirty="0"/>
-          </a:p>
-        </p:txBody>
-      </p:sp>
-      <p:sp>
-        <p:nvSpPr>
-          <p:cNvPr id="7" name="Content Placeholder 6"/>
-          <p:cNvSpPr>
-            <a:spLocks noGrp="1"/>
-          </p:cNvSpPr>
-          <p:nvPr>
-            <p:ph idx="1"/>
-          </p:nvPr>
-        </p:nvSpPr>
-        <p:spPr>
-          <a:xfrm>
-            <a:off x="2946400" y="3230881"/>
-            <a:ext cx="822960" cy="822960"/>
-          </a:xfrm>
-          <a:prstGeom prst="ellipse">
-            <a:avLst/>
-          </a:prstGeom>
-        </p:spPr>
-        <p:style>
-          <a:lnRef idx="1">
-            <a:schemeClr val="accent2"/>
-          </a:lnRef>
-          <a:fillRef idx="3">
-            <a:schemeClr val="accent2"/>
-          </a:fillRef>
-          <a:effectRef idx="2">
-            <a:schemeClr val="accent2"/>
-          </a:effectRef>
-          <a:fontRef idx="minor">
-            <a:schemeClr val="lt1"/>
-          </a:fontRef>
-        </p:style>
-        <p:txBody>
-          <a:bodyPr rtlCol="0" anchor="ctr"/>
-          <a:lstStyle/>
-          <a:p>
-            <a:pPr marL="0" indent="0" algn="ctr">
-              <a:buNone/>
-            </a:pPr>
-            <a:r>
-              <a:rPr lang="en-US" dirty="0" smtClean="0"/>
-              <a:t>80</a:t>
             </a:r>
             <a:endParaRPr lang="en-US" dirty="0"/>
           </a:p>
@@ -13854,74 +14292,39 @@
           <a:p>
             <a:r>
               <a:rPr lang="en-US" dirty="0" smtClean="0"/>
-              <a:t>Implementations</a:t>
+              <a:t>Bloom Filters</a:t>
             </a:r>
             <a:endParaRPr lang="en-US" dirty="0"/>
           </a:p>
         </p:txBody>
       </p:sp>
-      <p:sp>
-        <p:nvSpPr>
-          <p:cNvPr id="3" name="Content Placeholder 2"/>
-          <p:cNvSpPr>
-            <a:spLocks noGrp="1"/>
-          </p:cNvSpPr>
+      <p:pic>
+        <p:nvPicPr>
+          <p:cNvPr id="6" name="Content Placeholder 5" descr="649px-Bloom_filter.svg.png"/>
+          <p:cNvPicPr>
+            <a:picLocks noGrp="1" noChangeAspect="1"/>
+          </p:cNvPicPr>
           <p:nvPr>
             <p:ph idx="1"/>
           </p:nvPr>
-        </p:nvSpPr>
+        </p:nvPicPr>
+        <p:blipFill rotWithShape="1">
+          <a:blip r:embed="rId2">
+            <a:extLst>
+              <a:ext uri="{28A0092B-C50C-407E-A947-70E740481C1C}">
+                <a14:useLocalDpi xmlns:a14="http://schemas.microsoft.com/office/drawing/2010/main" val="0"/>
+              </a:ext>
+            </a:extLst>
+          </a:blip>
+          <a:srcRect l="17360" r="17360"/>
+          <a:stretch/>
+        </p:blipFill>
         <p:spPr/>
-        <p:txBody>
-          <a:bodyPr/>
-          <a:lstStyle/>
-          <a:p>
-            <a:r>
-              <a:rPr lang="en-US" dirty="0">
-                <a:hlinkClick r:id="rId2"/>
-              </a:rPr>
-              <a:t>https://github.com/mauriciosantos/buckets</a:t>
-            </a:r>
-            <a:r>
-              <a:rPr lang="en-US" dirty="0" smtClean="0">
-                <a:hlinkClick r:id="rId2"/>
-              </a:rPr>
-              <a:t>/</a:t>
-            </a:r>
-            <a:endParaRPr lang="en-US" dirty="0" smtClean="0"/>
-          </a:p>
-          <a:p>
-            <a:r>
-              <a:rPr lang="en-US" dirty="0"/>
-              <a:t>https://</a:t>
-            </a:r>
-            <a:r>
-              <a:rPr lang="en-US" dirty="0" err="1"/>
-              <a:t>github.com</a:t>
-            </a:r>
-            <a:r>
-              <a:rPr lang="en-US" dirty="0"/>
-              <a:t>/</a:t>
-            </a:r>
-            <a:r>
-              <a:rPr lang="en-US" dirty="0" err="1"/>
-              <a:t>felipernb</a:t>
-            </a:r>
-            <a:r>
-              <a:rPr lang="en-US" dirty="0"/>
-              <a:t>/</a:t>
-            </a:r>
-            <a:r>
-              <a:rPr lang="en-US"/>
-              <a:t>algorithms.js</a:t>
-            </a:r>
-            <a:endParaRPr lang="en-US" dirty="0"/>
-          </a:p>
-        </p:txBody>
-      </p:sp>
+      </p:pic>
     </p:spTree>
     <p:extLst>
       <p:ext uri="{BB962C8B-B14F-4D97-AF65-F5344CB8AC3E}">
-        <p14:creationId xmlns:p14="http://schemas.microsoft.com/office/powerpoint/2010/main" val="2967518521"/>
+        <p14:creationId xmlns:p14="http://schemas.microsoft.com/office/powerpoint/2010/main" val="2497985771"/>
       </p:ext>
     </p:extLst>
   </p:cSld>
@@ -14041,6 +14444,13 @@
   <p:clrMapOvr>
     <a:masterClrMapping/>
   </p:clrMapOvr>
+  <p:timing>
+    <p:tnLst>
+      <p:par>
+        <p:cTn xmlns:p14="http://schemas.microsoft.com/office/powerpoint/2010/main" id="1" dur="indefinite" restart="never" nodeType="tmRoot"/>
+      </p:par>
+    </p:tnLst>
+  </p:timing>
 </p:sld>
 </file>
 
@@ -14078,7 +14488,7 @@
           <a:p>
             <a:r>
               <a:rPr lang="en-US" dirty="0" smtClean="0"/>
-              <a:t>Image Credits</a:t>
+              <a:t>Implementations</a:t>
             </a:r>
             <a:endParaRPr lang="en-US" dirty="0"/>
           </a:p>
@@ -14103,28 +14513,58 @@
               <a:rPr lang="en-US" dirty="0">
                 <a:hlinkClick r:id="rId2"/>
               </a:rPr>
-              <a:t>http://cs.anu.edu.au/~bdm/</a:t>
+              <a:t>https://github.com/mauriciosantos/buckets</a:t>
             </a:r>
             <a:r>
               <a:rPr lang="en-US" dirty="0" smtClean="0">
                 <a:hlinkClick r:id="rId2"/>
               </a:rPr>
-              <a:t>tree.png</a:t>
+              <a:t>/</a:t>
             </a:r>
             <a:endParaRPr lang="en-US" dirty="0" smtClean="0"/>
           </a:p>
           <a:p>
             <a:r>
-              <a:rPr lang="en-US" dirty="0"/>
-              <a:t>http://</a:t>
-            </a:r>
-            <a:r>
-              <a:rPr lang="en-US" dirty="0" err="1"/>
-              <a:t>comjnl.oxfordjournals.org</a:t>
-            </a:r>
-            <a:r>
-              <a:rPr lang="en-US" dirty="0"/>
-              <a:t>/content/51/2/216/F1.large.jpg</a:t>
+              <a:rPr lang="en-US" dirty="0">
+                <a:hlinkClick r:id="rId3"/>
+              </a:rPr>
+              <a:t>https://github.com/felipernb/</a:t>
+            </a:r>
+            <a:r>
+              <a:rPr lang="en-US" dirty="0" smtClean="0">
+                <a:hlinkClick r:id="rId3"/>
+              </a:rPr>
+              <a:t>algorithms.js</a:t>
+            </a:r>
+            <a:endParaRPr lang="en-US" dirty="0" smtClean="0"/>
+          </a:p>
+          <a:p>
+            <a:r>
+              <a:rPr lang="en-US" dirty="0">
+                <a:hlinkClick r:id="rId4"/>
+              </a:rPr>
+              <a:t>https://github.com/montagejs/</a:t>
+            </a:r>
+            <a:r>
+              <a:rPr lang="en-US" dirty="0" smtClean="0">
+                <a:hlinkClick r:id="rId4"/>
+              </a:rPr>
+              <a:t>collections</a:t>
+            </a:r>
+            <a:endParaRPr lang="en-US" dirty="0" smtClean="0"/>
+          </a:p>
+          <a:p>
+            <a:r>
+              <a:rPr lang="en-US" dirty="0">
+                <a:hlinkClick r:id="rId5"/>
+              </a:rPr>
+              <a:t>https://github.com/monmohan/</a:t>
+            </a:r>
+            <a:r>
+              <a:rPr lang="en-US" dirty="0" smtClean="0">
+                <a:hlinkClick r:id="rId5"/>
+              </a:rPr>
+              <a:t>dsjslib</a:t>
             </a:r>
             <a:endParaRPr lang="en-US" dirty="0" smtClean="0"/>
           </a:p>
@@ -14136,7 +14576,7 @@
     </p:spTree>
     <p:extLst>
       <p:ext uri="{BB962C8B-B14F-4D97-AF65-F5344CB8AC3E}">
-        <p14:creationId xmlns:p14="http://schemas.microsoft.com/office/powerpoint/2010/main" val="1029471236"/>
+        <p14:creationId xmlns:p14="http://schemas.microsoft.com/office/powerpoint/2010/main" val="2967518521"/>
       </p:ext>
     </p:extLst>
   </p:cSld>
@@ -14180,7 +14620,7 @@
           <a:p>
             <a:r>
               <a:rPr lang="en-US" dirty="0" smtClean="0"/>
-              <a:t>References</a:t>
+              <a:t>Image Credits</a:t>
             </a:r>
             <a:endParaRPr lang="en-US" dirty="0"/>
           </a:p>
@@ -14198,8 +14638,128 @@
         </p:nvSpPr>
         <p:spPr/>
         <p:txBody>
+          <a:bodyPr/>
+          <a:lstStyle/>
+          <a:p>
+            <a:r>
+              <a:rPr lang="en-US" dirty="0">
+                <a:hlinkClick r:id="rId2"/>
+              </a:rPr>
+              <a:t>http://cs.anu.edu.au/~bdm/</a:t>
+            </a:r>
+            <a:r>
+              <a:rPr lang="en-US" dirty="0" smtClean="0">
+                <a:hlinkClick r:id="rId2"/>
+              </a:rPr>
+              <a:t>tree.png</a:t>
+            </a:r>
+            <a:endParaRPr lang="en-US" dirty="0" smtClean="0"/>
+          </a:p>
+          <a:p>
+            <a:r>
+              <a:rPr lang="en-US" dirty="0">
+                <a:hlinkClick r:id="rId3"/>
+              </a:rPr>
+              <a:t>http://comjnl.oxfordjournals.org/content/51/2/216/F1.</a:t>
+            </a:r>
+            <a:r>
+              <a:rPr lang="en-US" dirty="0" smtClean="0">
+                <a:hlinkClick r:id="rId3"/>
+              </a:rPr>
+              <a:t>large.jpg</a:t>
+            </a:r>
+            <a:endParaRPr lang="en-US" dirty="0" smtClean="0"/>
+          </a:p>
+          <a:p>
+            <a:r>
+              <a:rPr lang="en-US" dirty="0">
+                <a:hlinkClick r:id="rId4"/>
+              </a:rPr>
+              <a:t>http://en.wikipedia.org/wiki/Bloom_filter#mediaviewer/</a:t>
+            </a:r>
+            <a:r>
+              <a:rPr lang="en-US" dirty="0" smtClean="0">
+                <a:hlinkClick r:id="rId4"/>
+              </a:rPr>
+              <a:t>File:Bloom_filter.svg</a:t>
+            </a:r>
+            <a:endParaRPr lang="en-US" dirty="0" smtClean="0"/>
+          </a:p>
+          <a:p>
+            <a:endParaRPr lang="en-US" dirty="0" smtClean="0"/>
+          </a:p>
+          <a:p>
+            <a:endParaRPr lang="en-US" dirty="0"/>
+          </a:p>
+        </p:txBody>
+      </p:sp>
+    </p:spTree>
+    <p:extLst>
+      <p:ext uri="{BB962C8B-B14F-4D97-AF65-F5344CB8AC3E}">
+        <p14:creationId xmlns:p14="http://schemas.microsoft.com/office/powerpoint/2010/main" val="1029471236"/>
+      </p:ext>
+    </p:extLst>
+  </p:cSld>
+  <p:clrMapOvr>
+    <a:masterClrMapping/>
+  </p:clrMapOvr>
+</p:sld>
+</file>
+
+<file path=ppt/slides/slide22.xml><?xml version="1.0" encoding="utf-8"?>
+<p:sld xmlns:a="http://schemas.openxmlformats.org/drawingml/2006/main" xmlns:r="http://schemas.openxmlformats.org/officeDocument/2006/relationships" xmlns:p="http://schemas.openxmlformats.org/presentationml/2006/main">
+  <p:cSld>
+    <p:spTree>
+      <p:nvGrpSpPr>
+        <p:cNvPr id="1" name=""/>
+        <p:cNvGrpSpPr/>
+        <p:nvPr/>
+      </p:nvGrpSpPr>
+      <p:grpSpPr>
+        <a:xfrm>
+          <a:off x="0" y="0"/>
+          <a:ext cx="0" cy="0"/>
+          <a:chOff x="0" y="0"/>
+          <a:chExt cx="0" cy="0"/>
+        </a:xfrm>
+      </p:grpSpPr>
+      <p:sp>
+        <p:nvSpPr>
+          <p:cNvPr id="2" name="Title 1"/>
+          <p:cNvSpPr>
+            <a:spLocks noGrp="1"/>
+          </p:cNvSpPr>
+          <p:nvPr>
+            <p:ph type="title"/>
+          </p:nvPr>
+        </p:nvSpPr>
+        <p:spPr/>
+        <p:txBody>
+          <a:bodyPr/>
+          <a:lstStyle/>
+          <a:p>
+            <a:r>
+              <a:rPr lang="en-US" dirty="0" smtClean="0"/>
+              <a:t>References</a:t>
+            </a:r>
+            <a:endParaRPr lang="en-US" dirty="0"/>
+          </a:p>
+        </p:txBody>
+      </p:sp>
+      <p:sp>
+        <p:nvSpPr>
+          <p:cNvPr id="3" name="Content Placeholder 2"/>
+          <p:cNvSpPr>
+            <a:spLocks noGrp="1"/>
+          </p:cNvSpPr>
+          <p:nvPr>
+            <p:ph idx="1"/>
+          </p:nvPr>
+        </p:nvSpPr>
+        <p:spPr/>
+        <p:txBody>
           <a:bodyPr>
-            <a:normAutofit lnSpcReduction="10000"/>
+            <a:normAutofit fontScale="77500" lnSpcReduction="20000"/>
           </a:bodyPr>
           <a:lstStyle/>
           <a:p>
@@ -14303,6 +14863,21 @@
               </a:rPr>
               <a:t>Set</a:t>
             </a:r>
+            <a:endParaRPr lang="en-US" dirty="0" smtClean="0"/>
+          </a:p>
+          <a:p>
+            <a:r>
+              <a:rPr lang="en-US" dirty="0" smtClean="0">
+                <a:hlinkClick r:id="rId7"/>
+              </a:rPr>
+              <a:t>http://kangax.github.io/compat-table/es6/</a:t>
+            </a:r>
+            <a:endParaRPr lang="en-US" dirty="0" smtClean="0"/>
+          </a:p>
+          <a:p>
+            <a:pPr marL="0" indent="0">
+              <a:buNone/>
+            </a:pPr>
             <a:endParaRPr lang="en-US" dirty="0" smtClean="0"/>
           </a:p>
           <a:p>
@@ -14317,6 +14892,502 @@
     <p:extLst>
       <p:ext uri="{BB962C8B-B14F-4D97-AF65-F5344CB8AC3E}">
         <p14:creationId xmlns:p14="http://schemas.microsoft.com/office/powerpoint/2010/main" val="3128071695"/>
+      </p:ext>
+    </p:extLst>
+  </p:cSld>
+  <p:clrMapOvr>
+    <a:masterClrMapping/>
+  </p:clrMapOvr>
+</p:sld>
+</file>
+
+<file path=ppt/slides/slide23.xml><?xml version="1.0" encoding="utf-8"?>
+<p:sld xmlns:a="http://schemas.openxmlformats.org/drawingml/2006/main" xmlns:r="http://schemas.openxmlformats.org/officeDocument/2006/relationships" xmlns:p="http://schemas.openxmlformats.org/presentationml/2006/main">
+  <p:cSld>
+    <p:spTree>
+      <p:nvGrpSpPr>
+        <p:cNvPr id="1" name=""/>
+        <p:cNvGrpSpPr/>
+        <p:nvPr/>
+      </p:nvGrpSpPr>
+      <p:grpSpPr>
+        <a:xfrm>
+          <a:off x="0" y="0"/>
+          <a:ext cx="0" cy="0"/>
+          <a:chOff x="0" y="0"/>
+          <a:chExt cx="0" cy="0"/>
+        </a:xfrm>
+      </p:grpSpPr>
+      <p:sp>
+        <p:nvSpPr>
+          <p:cNvPr id="2" name="Title 1"/>
+          <p:cNvSpPr>
+            <a:spLocks noGrp="1"/>
+          </p:cNvSpPr>
+          <p:nvPr>
+            <p:ph type="title"/>
+          </p:nvPr>
+        </p:nvSpPr>
+        <p:spPr/>
+        <p:txBody>
+          <a:bodyPr/>
+          <a:lstStyle/>
+          <a:p>
+            <a:r>
+              <a:rPr lang="en-US" dirty="0" smtClean="0"/>
+              <a:t>Sample Problems</a:t>
+            </a:r>
+            <a:endParaRPr lang="en-US" dirty="0"/>
+          </a:p>
+        </p:txBody>
+      </p:sp>
+      <p:sp>
+        <p:nvSpPr>
+          <p:cNvPr id="3" name="Content Placeholder 2"/>
+          <p:cNvSpPr>
+            <a:spLocks noGrp="1"/>
+          </p:cNvSpPr>
+          <p:nvPr>
+            <p:ph idx="1"/>
+          </p:nvPr>
+        </p:nvSpPr>
+        <p:spPr/>
+        <p:txBody>
+          <a:bodyPr/>
+          <a:lstStyle/>
+          <a:p>
+            <a:r>
+              <a:rPr lang="en-US" dirty="0" smtClean="0"/>
+              <a:t>Given an array of size n, find if there are any duplicate elements</a:t>
+            </a:r>
+            <a:endParaRPr lang="en-US" dirty="0"/>
+          </a:p>
+        </p:txBody>
+      </p:sp>
+    </p:spTree>
+    <p:extLst>
+      <p:ext uri="{BB962C8B-B14F-4D97-AF65-F5344CB8AC3E}">
+        <p14:creationId xmlns:p14="http://schemas.microsoft.com/office/powerpoint/2010/main" val="241544963"/>
+      </p:ext>
+    </p:extLst>
+  </p:cSld>
+  <p:clrMapOvr>
+    <a:masterClrMapping/>
+  </p:clrMapOvr>
+</p:sld>
+</file>
+
+<file path=ppt/slides/slide24.xml><?xml version="1.0" encoding="utf-8"?>
+<p:sld xmlns:a="http://schemas.openxmlformats.org/drawingml/2006/main" xmlns:r="http://schemas.openxmlformats.org/officeDocument/2006/relationships" xmlns:p="http://schemas.openxmlformats.org/presentationml/2006/main">
+  <p:cSld>
+    <p:spTree>
+      <p:nvGrpSpPr>
+        <p:cNvPr id="1" name=""/>
+        <p:cNvGrpSpPr/>
+        <p:nvPr/>
+      </p:nvGrpSpPr>
+      <p:grpSpPr>
+        <a:xfrm>
+          <a:off x="0" y="0"/>
+          <a:ext cx="0" cy="0"/>
+          <a:chOff x="0" y="0"/>
+          <a:chExt cx="0" cy="0"/>
+        </a:xfrm>
+      </p:grpSpPr>
+      <p:sp>
+        <p:nvSpPr>
+          <p:cNvPr id="2" name="Title 1"/>
+          <p:cNvSpPr>
+            <a:spLocks noGrp="1"/>
+          </p:cNvSpPr>
+          <p:nvPr>
+            <p:ph type="title"/>
+          </p:nvPr>
+        </p:nvSpPr>
+        <p:spPr/>
+        <p:txBody>
+          <a:bodyPr/>
+          <a:lstStyle/>
+          <a:p>
+            <a:r>
+              <a:rPr lang="en-US" dirty="0" smtClean="0"/>
+              <a:t>Sample Problems</a:t>
+            </a:r>
+            <a:endParaRPr lang="en-US" dirty="0"/>
+          </a:p>
+        </p:txBody>
+      </p:sp>
+      <p:sp>
+        <p:nvSpPr>
+          <p:cNvPr id="3" name="Content Placeholder 2"/>
+          <p:cNvSpPr>
+            <a:spLocks noGrp="1"/>
+          </p:cNvSpPr>
+          <p:nvPr>
+            <p:ph idx="1"/>
+          </p:nvPr>
+        </p:nvSpPr>
+        <p:spPr/>
+        <p:txBody>
+          <a:bodyPr/>
+          <a:lstStyle/>
+          <a:p>
+            <a:r>
+              <a:rPr lang="en-US" dirty="0" smtClean="0"/>
+              <a:t>Given two arrays – Find smallest common element</a:t>
+            </a:r>
+            <a:endParaRPr lang="en-US" dirty="0"/>
+          </a:p>
+        </p:txBody>
+      </p:sp>
+    </p:spTree>
+    <p:extLst>
+      <p:ext uri="{BB962C8B-B14F-4D97-AF65-F5344CB8AC3E}">
+        <p14:creationId xmlns:p14="http://schemas.microsoft.com/office/powerpoint/2010/main" val="2203082823"/>
+      </p:ext>
+    </p:extLst>
+  </p:cSld>
+  <p:clrMapOvr>
+    <a:masterClrMapping/>
+  </p:clrMapOvr>
+</p:sld>
+</file>
+
+<file path=ppt/slides/slide25.xml><?xml version="1.0" encoding="utf-8"?>
+<p:sld xmlns:a="http://schemas.openxmlformats.org/drawingml/2006/main" xmlns:r="http://schemas.openxmlformats.org/officeDocument/2006/relationships" xmlns:p="http://schemas.openxmlformats.org/presentationml/2006/main">
+  <p:cSld>
+    <p:spTree>
+      <p:nvGrpSpPr>
+        <p:cNvPr id="1" name=""/>
+        <p:cNvGrpSpPr/>
+        <p:nvPr/>
+      </p:nvGrpSpPr>
+      <p:grpSpPr>
+        <a:xfrm>
+          <a:off x="0" y="0"/>
+          <a:ext cx="0" cy="0"/>
+          <a:chOff x="0" y="0"/>
+          <a:chExt cx="0" cy="0"/>
+        </a:xfrm>
+      </p:grpSpPr>
+      <p:sp>
+        <p:nvSpPr>
+          <p:cNvPr id="2" name="Title 1"/>
+          <p:cNvSpPr>
+            <a:spLocks noGrp="1"/>
+          </p:cNvSpPr>
+          <p:nvPr>
+            <p:ph type="title"/>
+          </p:nvPr>
+        </p:nvSpPr>
+        <p:spPr/>
+        <p:txBody>
+          <a:bodyPr/>
+          <a:lstStyle/>
+          <a:p>
+            <a:r>
+              <a:rPr lang="en-US" dirty="0"/>
+              <a:t>Sample Problems</a:t>
+            </a:r>
+          </a:p>
+        </p:txBody>
+      </p:sp>
+      <p:sp>
+        <p:nvSpPr>
+          <p:cNvPr id="3" name="Content Placeholder 2"/>
+          <p:cNvSpPr>
+            <a:spLocks noGrp="1"/>
+          </p:cNvSpPr>
+          <p:nvPr>
+            <p:ph idx="1"/>
+          </p:nvPr>
+        </p:nvSpPr>
+        <p:spPr/>
+        <p:txBody>
+          <a:bodyPr/>
+          <a:lstStyle/>
+          <a:p>
+            <a:r>
+              <a:rPr lang="en-US" dirty="0" smtClean="0"/>
+              <a:t>Reverse a sentence</a:t>
+            </a:r>
+          </a:p>
+          <a:p>
+            <a:pPr lvl="1"/>
+            <a:r>
+              <a:rPr lang="en-US" dirty="0" smtClean="0"/>
+              <a:t>I am solving a problem</a:t>
+            </a:r>
+          </a:p>
+          <a:p>
+            <a:pPr lvl="1"/>
+            <a:r>
+              <a:rPr lang="en-US" dirty="0"/>
+              <a:t>p</a:t>
+            </a:r>
+            <a:r>
+              <a:rPr lang="en-US" dirty="0" smtClean="0"/>
+              <a:t>roblem a </a:t>
+            </a:r>
+            <a:r>
+              <a:rPr lang="en-US" dirty="0" smtClean="0"/>
+              <a:t>solving am </a:t>
+            </a:r>
+            <a:r>
+              <a:rPr lang="en-US" dirty="0" smtClean="0"/>
+              <a:t>I</a:t>
+            </a:r>
+            <a:endParaRPr lang="en-US" dirty="0"/>
+          </a:p>
+        </p:txBody>
+      </p:sp>
+    </p:spTree>
+    <p:extLst>
+      <p:ext uri="{BB962C8B-B14F-4D97-AF65-F5344CB8AC3E}">
+        <p14:creationId xmlns:p14="http://schemas.microsoft.com/office/powerpoint/2010/main" val="1173673221"/>
+      </p:ext>
+    </p:extLst>
+  </p:cSld>
+  <p:clrMapOvr>
+    <a:masterClrMapping/>
+  </p:clrMapOvr>
+</p:sld>
+</file>
+
+<file path=ppt/slides/slide26.xml><?xml version="1.0" encoding="utf-8"?>
+<p:sld xmlns:a="http://schemas.openxmlformats.org/drawingml/2006/main" xmlns:r="http://schemas.openxmlformats.org/officeDocument/2006/relationships" xmlns:p="http://schemas.openxmlformats.org/presentationml/2006/main">
+  <p:cSld>
+    <p:spTree>
+      <p:nvGrpSpPr>
+        <p:cNvPr id="1" name=""/>
+        <p:cNvGrpSpPr/>
+        <p:nvPr/>
+      </p:nvGrpSpPr>
+      <p:grpSpPr>
+        <a:xfrm>
+          <a:off x="0" y="0"/>
+          <a:ext cx="0" cy="0"/>
+          <a:chOff x="0" y="0"/>
+          <a:chExt cx="0" cy="0"/>
+        </a:xfrm>
+      </p:grpSpPr>
+      <p:sp>
+        <p:nvSpPr>
+          <p:cNvPr id="2" name="Title 1"/>
+          <p:cNvSpPr>
+            <a:spLocks noGrp="1"/>
+          </p:cNvSpPr>
+          <p:nvPr>
+            <p:ph type="title"/>
+          </p:nvPr>
+        </p:nvSpPr>
+        <p:spPr/>
+        <p:txBody>
+          <a:bodyPr/>
+          <a:lstStyle/>
+          <a:p>
+            <a:r>
+              <a:rPr lang="en-US" dirty="0"/>
+              <a:t>Sample Problems</a:t>
+            </a:r>
+          </a:p>
+        </p:txBody>
+      </p:sp>
+      <p:sp>
+        <p:nvSpPr>
+          <p:cNvPr id="3" name="Content Placeholder 2"/>
+          <p:cNvSpPr>
+            <a:spLocks noGrp="1"/>
+          </p:cNvSpPr>
+          <p:nvPr>
+            <p:ph idx="1"/>
+          </p:nvPr>
+        </p:nvSpPr>
+        <p:spPr/>
+        <p:txBody>
+          <a:bodyPr/>
+          <a:lstStyle/>
+          <a:p>
+            <a:r>
+              <a:rPr lang="en-US" dirty="0"/>
+              <a:t>For a given book, find the k most occurring words </a:t>
+            </a:r>
+          </a:p>
+          <a:p>
+            <a:endParaRPr lang="en-US" dirty="0"/>
+          </a:p>
+        </p:txBody>
+      </p:sp>
+    </p:spTree>
+    <p:extLst>
+      <p:ext uri="{BB962C8B-B14F-4D97-AF65-F5344CB8AC3E}">
+        <p14:creationId xmlns:p14="http://schemas.microsoft.com/office/powerpoint/2010/main" val="949512599"/>
+      </p:ext>
+    </p:extLst>
+  </p:cSld>
+  <p:clrMapOvr>
+    <a:masterClrMapping/>
+  </p:clrMapOvr>
+</p:sld>
+</file>
+
+<file path=ppt/slides/slide27.xml><?xml version="1.0" encoding="utf-8"?>
+<p:sld xmlns:a="http://schemas.openxmlformats.org/drawingml/2006/main" xmlns:r="http://schemas.openxmlformats.org/officeDocument/2006/relationships" xmlns:p="http://schemas.openxmlformats.org/presentationml/2006/main">
+  <p:cSld>
+    <p:spTree>
+      <p:nvGrpSpPr>
+        <p:cNvPr id="1" name=""/>
+        <p:cNvGrpSpPr/>
+        <p:nvPr/>
+      </p:nvGrpSpPr>
+      <p:grpSpPr>
+        <a:xfrm>
+          <a:off x="0" y="0"/>
+          <a:ext cx="0" cy="0"/>
+          <a:chOff x="0" y="0"/>
+          <a:chExt cx="0" cy="0"/>
+        </a:xfrm>
+      </p:grpSpPr>
+      <p:sp>
+        <p:nvSpPr>
+          <p:cNvPr id="2" name="Title 1"/>
+          <p:cNvSpPr>
+            <a:spLocks noGrp="1"/>
+          </p:cNvSpPr>
+          <p:nvPr>
+            <p:ph type="title"/>
+          </p:nvPr>
+        </p:nvSpPr>
+        <p:spPr/>
+        <p:txBody>
+          <a:bodyPr/>
+          <a:lstStyle/>
+          <a:p>
+            <a:r>
+              <a:rPr lang="en-US" dirty="0" smtClean="0"/>
+              <a:t>Sample Problems</a:t>
+            </a:r>
+            <a:endParaRPr lang="en-US" dirty="0"/>
+          </a:p>
+        </p:txBody>
+      </p:sp>
+      <p:sp>
+        <p:nvSpPr>
+          <p:cNvPr id="3" name="Content Placeholder 2"/>
+          <p:cNvSpPr>
+            <a:spLocks noGrp="1"/>
+          </p:cNvSpPr>
+          <p:nvPr>
+            <p:ph idx="1"/>
+          </p:nvPr>
+        </p:nvSpPr>
+        <p:spPr/>
+        <p:txBody>
+          <a:bodyPr/>
+          <a:lstStyle/>
+          <a:p>
+            <a:r>
+              <a:rPr lang="en-US" dirty="0" smtClean="0"/>
+              <a:t>Given a stream of integers, find k smallest integers</a:t>
+            </a:r>
+            <a:endParaRPr lang="en-US" dirty="0"/>
+          </a:p>
+        </p:txBody>
+      </p:sp>
+    </p:spTree>
+    <p:extLst>
+      <p:ext uri="{BB962C8B-B14F-4D97-AF65-F5344CB8AC3E}">
+        <p14:creationId xmlns:p14="http://schemas.microsoft.com/office/powerpoint/2010/main" val="608061125"/>
+      </p:ext>
+    </p:extLst>
+  </p:cSld>
+  <p:clrMapOvr>
+    <a:masterClrMapping/>
+  </p:clrMapOvr>
+</p:sld>
+</file>
+
+<file path=ppt/slides/slide28.xml><?xml version="1.0" encoding="utf-8"?>
+<p:sld xmlns:a="http://schemas.openxmlformats.org/drawingml/2006/main" xmlns:r="http://schemas.openxmlformats.org/officeDocument/2006/relationships" xmlns:p="http://schemas.openxmlformats.org/presentationml/2006/main">
+  <p:cSld>
+    <p:spTree>
+      <p:nvGrpSpPr>
+        <p:cNvPr id="1" name=""/>
+        <p:cNvGrpSpPr/>
+        <p:nvPr/>
+      </p:nvGrpSpPr>
+      <p:grpSpPr>
+        <a:xfrm>
+          <a:off x="0" y="0"/>
+          <a:ext cx="0" cy="0"/>
+          <a:chOff x="0" y="0"/>
+          <a:chExt cx="0" cy="0"/>
+        </a:xfrm>
+      </p:grpSpPr>
+      <p:sp>
+        <p:nvSpPr>
+          <p:cNvPr id="2" name="Title 1"/>
+          <p:cNvSpPr>
+            <a:spLocks noGrp="1"/>
+          </p:cNvSpPr>
+          <p:nvPr>
+            <p:ph type="title"/>
+          </p:nvPr>
+        </p:nvSpPr>
+        <p:spPr/>
+        <p:txBody>
+          <a:bodyPr/>
+          <a:lstStyle/>
+          <a:p>
+            <a:r>
+              <a:rPr lang="en-US" dirty="0" smtClean="0"/>
+              <a:t>Thanks!</a:t>
+            </a:r>
+            <a:endParaRPr lang="en-US" dirty="0"/>
+          </a:p>
+        </p:txBody>
+      </p:sp>
+      <p:sp>
+        <p:nvSpPr>
+          <p:cNvPr id="3" name="Content Placeholder 2"/>
+          <p:cNvSpPr>
+            <a:spLocks noGrp="1"/>
+          </p:cNvSpPr>
+          <p:nvPr>
+            <p:ph idx="1"/>
+          </p:nvPr>
+        </p:nvSpPr>
+        <p:spPr/>
+        <p:txBody>
+          <a:bodyPr/>
+          <a:lstStyle/>
+          <a:p>
+            <a:r>
+              <a:rPr lang="en-US" dirty="0" smtClean="0">
+                <a:hlinkClick r:id="rId2"/>
+              </a:rPr>
+              <a:t>http://alumni.cs.ucsb.edu/~rajesh/js_talk.pptx</a:t>
+            </a:r>
+            <a:endParaRPr lang="en-US" dirty="0" smtClean="0"/>
+          </a:p>
+          <a:p>
+            <a:r>
+              <a:rPr lang="en-US" dirty="0" smtClean="0">
+                <a:hlinkClick r:id="rId3"/>
+              </a:rPr>
+              <a:t>rajesh@uber.com</a:t>
+            </a:r>
+            <a:endParaRPr lang="en-US" dirty="0" smtClean="0"/>
+          </a:p>
+          <a:p>
+            <a:endParaRPr lang="en-US" dirty="0"/>
+          </a:p>
+        </p:txBody>
+      </p:sp>
+    </p:spTree>
+    <p:extLst>
+      <p:ext uri="{BB962C8B-B14F-4D97-AF65-F5344CB8AC3E}">
+        <p14:creationId xmlns:p14="http://schemas.microsoft.com/office/powerpoint/2010/main" val="1288307970"/>
       </p:ext>
     </p:extLst>
   </p:cSld>
@@ -14352,7 +15423,7 @@
           <p:nvPr/>
         </p:nvPicPr>
         <p:blipFill>
-          <a:blip r:embed="rId2">
+          <a:blip r:embed="rId3">
             <a:extLst>
               <a:ext uri="{28A0092B-C50C-407E-A947-70E740481C1C}">
                 <a14:useLocalDpi xmlns:a14="http://schemas.microsoft.com/office/drawing/2010/main" val="0"/>
@@ -14383,6 +15454,13 @@
   <p:clrMapOvr>
     <a:masterClrMapping/>
   </p:clrMapOvr>
+  <p:timing>
+    <p:tnLst>
+      <p:par>
+        <p:cTn xmlns:p14="http://schemas.microsoft.com/office/powerpoint/2010/main" id="1" dur="indefinite" restart="never" nodeType="tmRoot"/>
+      </p:par>
+    </p:tnLst>
+  </p:timing>
 </p:sld>
 </file>
 
@@ -16157,7 +17235,7 @@
         </p:spPr>
         <p:txBody>
           <a:bodyPr>
-            <a:normAutofit fontScale="92500" lnSpcReduction="20000"/>
+            <a:normAutofit fontScale="70000" lnSpcReduction="20000"/>
           </a:bodyPr>
           <a:lstStyle/>
           <a:p>
@@ -18032,7 +19110,9 @@
           </a:solidFill>
         </p:spPr>
         <p:txBody>
-          <a:bodyPr/>
+          <a:bodyPr>
+            <a:normAutofit fontScale="92500" lnSpcReduction="10000"/>
+          </a:bodyPr>
           <a:lstStyle/>
           <a:p>
             <a:pPr marL="0" marR="0" indent="0">
@@ -18353,9 +19433,9 @@
 </file>
 
 <file path=ppt/theme/theme1.xml><?xml version="1.0" encoding="utf-8"?>
-<a:theme xmlns:a="http://schemas.openxmlformats.org/drawingml/2006/main" name="Executive">
+<a:theme xmlns:a="http://schemas.openxmlformats.org/drawingml/2006/main" name="Office Theme">
   <a:themeElements>
-    <a:clrScheme name="Executive">
+    <a:clrScheme name="Office">
       <a:dk1>
         <a:sysClr val="windowText" lastClr="000000"/>
       </a:dk1>
@@ -18363,83 +19443,48 @@
         <a:sysClr val="window" lastClr="FFFFFF"/>
       </a:lt1>
       <a:dk2>
-        <a:srgbClr val="2F5897"/>
+        <a:srgbClr val="1F497D"/>
       </a:dk2>
       <a:lt2>
-        <a:srgbClr val="E4E9EF"/>
+        <a:srgbClr val="EEECE1"/>
       </a:lt2>
       <a:accent1>
-        <a:srgbClr val="6076B4"/>
+        <a:srgbClr val="4F81BD"/>
       </a:accent1>
       <a:accent2>
-        <a:srgbClr val="9C5252"/>
+        <a:srgbClr val="C0504D"/>
       </a:accent2>
       <a:accent3>
-        <a:srgbClr val="E68422"/>
+        <a:srgbClr val="9BBB59"/>
       </a:accent3>
       <a:accent4>
-        <a:srgbClr val="846648"/>
+        <a:srgbClr val="8064A2"/>
       </a:accent4>
       <a:accent5>
-        <a:srgbClr val="63891F"/>
+        <a:srgbClr val="4BACC6"/>
       </a:accent5>
       <a:accent6>
-        <a:srgbClr val="758085"/>
+        <a:srgbClr val="F79646"/>
       </a:accent6>
       <a:hlink>
-        <a:srgbClr val="3399FF"/>
+        <a:srgbClr val="0000FF"/>
       </a:hlink>
       <a:folHlink>
-        <a:srgbClr val="B2B2B2"/>
+        <a:srgbClr val="800080"/>
       </a:folHlink>
     </a:clrScheme>
-    <a:fontScheme name="Executive">
+    <a:fontScheme name="Office">
       <a:majorFont>
-        <a:latin typeface="Century Gothic"/>
+        <a:latin typeface="Calibri"/>
         <a:ea typeface=""/>
         <a:cs typeface=""/>
-        <a:font script="Jpan" typeface="ＭＳ ゴシック"/>
-        <a:font script="Hang" typeface="HY중고딕"/>
-        <a:font script="Hans" typeface="微软雅黑"/>
-        <a:font script="Hant" typeface="微軟正黑體"/>
-        <a:font script="Arab" typeface="Tahoma"/>
-        <a:font script="Hebr" typeface="Gisha"/>
-        <a:font script="Thai" typeface="DilleniaUPC"/>
-        <a:font script="Ethi" typeface="Nyala"/>
-        <a:font script="Beng" typeface="Vrinda"/>
-        <a:font script="Gujr" typeface="Shruti"/>
-        <a:font script="Khmr" typeface="DaunPenh"/>
-        <a:font script="Knda" typeface="Tunga"/>
-        <a:font script="Guru" typeface="Raavi"/>
-        <a:font script="Cans" typeface="Euphemia"/>
-        <a:font script="Cher" typeface="Plantagenet Cherokee"/>
-        <a:font script="Yiii" typeface="Microsoft Yi Baiti"/>
-        <a:font script="Tibt" typeface="Microsoft Himalaya"/>
-        <a:font script="Thaa" typeface="MV Boli"/>
-        <a:font script="Deva" typeface="Mangal"/>
-        <a:font script="Telu" typeface="Gautami"/>
-        <a:font script="Taml" typeface="Latha"/>
-        <a:font script="Syrc" typeface="Estrangelo Edessa"/>
-        <a:font script="Orya" typeface="Kalinga"/>
-        <a:font script="Mlym" typeface="Kartika"/>
-        <a:font script="Laoo" typeface="DokChampa"/>
-        <a:font script="Sinh" typeface="Iskoola Pota"/>
-        <a:font script="Mong" typeface="Mongolian Baiti"/>
-        <a:font script="Viet" typeface="Tahoma"/>
-        <a:font script="Uigh" typeface="Microsoft Uighur"/>
-        <a:font script="Geor" typeface="Sylfaen"/>
-      </a:majorFont>
-      <a:minorFont>
-        <a:latin typeface="Palatino Linotype"/>
-        <a:ea typeface=""/>
-        <a:cs typeface=""/>
-        <a:font script="Jpan" typeface="HGS明朝E"/>
+        <a:font script="Jpan" typeface="ＭＳ Ｐゴシック"/>
         <a:font script="Hang" typeface="맑은 고딕"/>
         <a:font script="Hans" typeface="宋体"/>
         <a:font script="Hant" typeface="新細明體"/>
         <a:font script="Arab" typeface="Times New Roman"/>
         <a:font script="Hebr" typeface="Times New Roman"/>
-        <a:font script="Thai" typeface="Browallia New"/>
+        <a:font script="Thai" typeface="Angsana New"/>
         <a:font script="Ethi" typeface="Nyala"/>
         <a:font script="Beng" typeface="Vrinda"/>
         <a:font script="Gujr" typeface="Shruti"/>
@@ -18463,9 +19508,44 @@
         <a:font script="Viet" typeface="Times New Roman"/>
         <a:font script="Uigh" typeface="Microsoft Uighur"/>
         <a:font script="Geor" typeface="Sylfaen"/>
+      </a:majorFont>
+      <a:minorFont>
+        <a:latin typeface="Calibri"/>
+        <a:ea typeface=""/>
+        <a:cs typeface=""/>
+        <a:font script="Jpan" typeface="ＭＳ Ｐゴシック"/>
+        <a:font script="Hang" typeface="맑은 고딕"/>
+        <a:font script="Hans" typeface="宋体"/>
+        <a:font script="Hant" typeface="新細明體"/>
+        <a:font script="Arab" typeface="Arial"/>
+        <a:font script="Hebr" typeface="Arial"/>
+        <a:font script="Thai" typeface="Cordia New"/>
+        <a:font script="Ethi" typeface="Nyala"/>
+        <a:font script="Beng" typeface="Vrinda"/>
+        <a:font script="Gujr" typeface="Shruti"/>
+        <a:font script="Khmr" typeface="DaunPenh"/>
+        <a:font script="Knda" typeface="Tunga"/>
+        <a:font script="Guru" typeface="Raavi"/>
+        <a:font script="Cans" typeface="Euphemia"/>
+        <a:font script="Cher" typeface="Plantagenet Cherokee"/>
+        <a:font script="Yiii" typeface="Microsoft Yi Baiti"/>
+        <a:font script="Tibt" typeface="Microsoft Himalaya"/>
+        <a:font script="Thaa" typeface="MV Boli"/>
+        <a:font script="Deva" typeface="Mangal"/>
+        <a:font script="Telu" typeface="Gautami"/>
+        <a:font script="Taml" typeface="Latha"/>
+        <a:font script="Syrc" typeface="Estrangelo Edessa"/>
+        <a:font script="Orya" typeface="Kalinga"/>
+        <a:font script="Mlym" typeface="Kartika"/>
+        <a:font script="Laoo" typeface="DokChampa"/>
+        <a:font script="Sinh" typeface="Iskoola Pota"/>
+        <a:font script="Mong" typeface="Mongolian Baiti"/>
+        <a:font script="Viet" typeface="Arial"/>
+        <a:font script="Uigh" typeface="Microsoft Uighur"/>
+        <a:font script="Geor" typeface="Sylfaen"/>
       </a:minorFont>
     </a:fontScheme>
-    <a:fmtScheme name="Executive">
+    <a:fmtScheme name="Office">
       <a:fillStyleLst>
         <a:solidFill>
           <a:schemeClr val="phClr"/>
@@ -18497,20 +19577,16 @@
           <a:gsLst>
             <a:gs pos="0">
               <a:schemeClr val="phClr">
-                <a:shade val="51000"/>
-                <a:satMod val="130000"/>
-              </a:schemeClr>
-            </a:gs>
-            <a:gs pos="80000">
-              <a:schemeClr val="phClr">
-                <a:shade val="93000"/>
+                <a:tint val="100000"/>
+                <a:shade val="100000"/>
                 <a:satMod val="130000"/>
               </a:schemeClr>
             </a:gs>
             <a:gs pos="100000">
               <a:schemeClr val="phClr">
-                <a:shade val="94000"/>
-                <a:satMod val="135000"/>
+                <a:tint val="50000"/>
+                <a:shade val="100000"/>
+                <a:satMod val="350000"/>
               </a:schemeClr>
             </a:gs>
           </a:gsLst>
@@ -18527,13 +19603,13 @@
           </a:solidFill>
           <a:prstDash val="solid"/>
         </a:ln>
-        <a:ln w="28575" cap="flat" cmpd="sng" algn="ctr">
+        <a:ln w="25400" cap="flat" cmpd="sng" algn="ctr">
           <a:solidFill>
             <a:schemeClr val="phClr"/>
           </a:solidFill>
           <a:prstDash val="solid"/>
         </a:ln>
-        <a:ln w="50800" cap="flat" cmpd="sng" algn="ctr">
+        <a:ln w="38100" cap="flat" cmpd="sng" algn="ctr">
           <a:solidFill>
             <a:schemeClr val="phClr"/>
           </a:solidFill>
@@ -18586,24 +19662,42 @@
         </a:solidFill>
         <a:gradFill rotWithShape="1">
           <a:gsLst>
-            <a:gs pos="50000">
+            <a:gs pos="0">
+              <a:schemeClr val="phClr">
+                <a:tint val="40000"/>
+                <a:satMod val="350000"/>
+              </a:schemeClr>
+            </a:gs>
+            <a:gs pos="40000">
+              <a:schemeClr val="phClr">
+                <a:tint val="45000"/>
+                <a:shade val="99000"/>
+                <a:satMod val="350000"/>
+              </a:schemeClr>
+            </a:gs>
+            <a:gs pos="100000">
+              <a:schemeClr val="phClr">
+                <a:shade val="20000"/>
+                <a:satMod val="255000"/>
+              </a:schemeClr>
+            </a:gs>
+          </a:gsLst>
+          <a:path path="circle">
+            <a:fillToRect l="50000" t="-80000" r="50000" b="180000"/>
+          </a:path>
+        </a:gradFill>
+        <a:gradFill rotWithShape="1">
+          <a:gsLst>
+            <a:gs pos="0">
               <a:schemeClr val="phClr">
                 <a:tint val="80000"/>
-                <a:satMod val="250000"/>
+                <a:satMod val="300000"/>
               </a:schemeClr>
             </a:gs>
-            <a:gs pos="76000">
+            <a:gs pos="100000">
               <a:schemeClr val="phClr">
-                <a:tint val="90000"/>
-                <a:shade val="90000"/>
+                <a:shade val="30000"/>
                 <a:satMod val="200000"/>
-              </a:schemeClr>
-            </a:gs>
-            <a:gs pos="92000">
-              <a:schemeClr val="phClr">
-                <a:tint val="90000"/>
-                <a:shade val="70000"/>
-                <a:satMod val="250000"/>
               </a:schemeClr>
             </a:gs>
           </a:gsLst>
@@ -18611,23 +19705,49 @@
             <a:fillToRect l="50000" t="50000" r="50000" b="50000"/>
           </a:path>
         </a:gradFill>
-        <a:blipFill>
-          <a:blip xmlns:r="http://schemas.openxmlformats.org/officeDocument/2006/relationships" r:embed="rId1">
-            <a:duotone>
-              <a:schemeClr val="phClr">
-                <a:tint val="95000"/>
-              </a:schemeClr>
-              <a:schemeClr val="phClr">
-                <a:shade val="90000"/>
-              </a:schemeClr>
-            </a:duotone>
-          </a:blip>
-          <a:tile tx="0" ty="0" sx="100000" sy="100000" flip="none" algn="tl"/>
-        </a:blipFill>
       </a:bgFillStyleLst>
     </a:fmtScheme>
   </a:themeElements>
-  <a:objectDefaults/>
+  <a:objectDefaults>
+    <a:spDef>
+      <a:spPr/>
+      <a:bodyPr/>
+      <a:lstStyle/>
+      <a:style>
+        <a:lnRef idx="1">
+          <a:schemeClr val="accent1"/>
+        </a:lnRef>
+        <a:fillRef idx="3">
+          <a:schemeClr val="accent1"/>
+        </a:fillRef>
+        <a:effectRef idx="2">
+          <a:schemeClr val="accent1"/>
+        </a:effectRef>
+        <a:fontRef idx="minor">
+          <a:schemeClr val="lt1"/>
+        </a:fontRef>
+      </a:style>
+    </a:spDef>
+    <a:lnDef>
+      <a:spPr/>
+      <a:bodyPr/>
+      <a:lstStyle/>
+      <a:style>
+        <a:lnRef idx="2">
+          <a:schemeClr val="accent1"/>
+        </a:lnRef>
+        <a:fillRef idx="0">
+          <a:schemeClr val="accent1"/>
+        </a:fillRef>
+        <a:effectRef idx="1">
+          <a:schemeClr val="accent1"/>
+        </a:effectRef>
+        <a:fontRef idx="minor">
+          <a:schemeClr val="tx1"/>
+        </a:fontRef>
+      </a:style>
+    </a:lnDef>
+  </a:objectDefaults>
   <a:extraClrSchemeLst/>
 </a:theme>
 </file>

</xml_diff>